<commit_message>
Now the footer contains navigation bar
</commit_message>
<xml_diff>
--- a/Web_Application_Programming_FinalProject_Presentation_201821181_JisanKim.pptx
+++ b/Web_Application_Programming_FinalProject_Presentation_201821181_JisanKim.pptx
@@ -148,13 +148,123 @@
 <file path=ppt/revisionInfo.xml><?xml version="1.0" encoding="utf-8"?>
 <p1510:revInfo xmlns:a="http://schemas.openxmlformats.org/drawingml/2006/main" xmlns:r="http://schemas.openxmlformats.org/officeDocument/2006/relationships" xmlns:p1510="http://schemas.microsoft.com/office/powerpoint/2015/10/main">
   <p1510:revLst>
-    <p1510:client id="{7AA45BCF-42B2-4DF9-9501-9DE1F64E013C}" v="30" dt="2024-11-13T01:56:22.595"/>
+    <p1510:client id="{81A18545-CA98-456E-A82F-B31D95D1B123}" v="2" dt="2024-11-14T08:04:27.474"/>
   </p1510:revLst>
 </p1510:revInfo>
 </file>
 
 <file path=ppt/changesInfos/changesInfo1.xml><?xml version="1.0" encoding="utf-8"?>
 <pc:chgInfo xmlns:a="http://schemas.openxmlformats.org/drawingml/2006/main" xmlns:r="http://schemas.openxmlformats.org/officeDocument/2006/relationships" xmlns:ac="http://schemas.microsoft.com/office/drawing/2013/main/command" xmlns:pc="http://schemas.microsoft.com/office/powerpoint/2013/main/command">
+  <pc:docChgLst>
+    <pc:chgData name="JISAN KIM" userId="afa2f7115fd23738" providerId="LiveId" clId="{81A18545-CA98-456E-A82F-B31D95D1B123}"/>
+    <pc:docChg chg="custSel modSld">
+      <pc:chgData name="JISAN KIM" userId="afa2f7115fd23738" providerId="LiveId" clId="{81A18545-CA98-456E-A82F-B31D95D1B123}" dt="2024-11-14T08:06:03.415" v="81" actId="1076"/>
+      <pc:docMkLst>
+        <pc:docMk/>
+      </pc:docMkLst>
+      <pc:sldChg chg="addSp delSp modSp mod">
+        <pc:chgData name="JISAN KIM" userId="afa2f7115fd23738" providerId="LiveId" clId="{81A18545-CA98-456E-A82F-B31D95D1B123}" dt="2024-11-14T08:03:47.244" v="4" actId="1076"/>
+        <pc:sldMkLst>
+          <pc:docMk/>
+          <pc:sldMk cId="2064622165" sldId="258"/>
+        </pc:sldMkLst>
+        <pc:picChg chg="add mod">
+          <ac:chgData name="JISAN KIM" userId="afa2f7115fd23738" providerId="LiveId" clId="{81A18545-CA98-456E-A82F-B31D95D1B123}" dt="2024-11-14T08:03:47.244" v="4" actId="1076"/>
+          <ac:picMkLst>
+            <pc:docMk/>
+            <pc:sldMk cId="2064622165" sldId="258"/>
+            <ac:picMk id="8" creationId="{13BA5FFE-B938-8C95-E552-135575270AA7}"/>
+          </ac:picMkLst>
+        </pc:picChg>
+        <pc:picChg chg="del">
+          <ac:chgData name="JISAN KIM" userId="afa2f7115fd23738" providerId="LiveId" clId="{81A18545-CA98-456E-A82F-B31D95D1B123}" dt="2024-11-14T08:03:35.928" v="0" actId="478"/>
+          <ac:picMkLst>
+            <pc:docMk/>
+            <pc:sldMk cId="2064622165" sldId="258"/>
+            <ac:picMk id="13" creationId="{D686DD4E-002F-445F-D796-3D52B1F0B9C4}"/>
+          </ac:picMkLst>
+        </pc:picChg>
+      </pc:sldChg>
+      <pc:sldChg chg="addSp delSp modSp mod">
+        <pc:chgData name="JISAN KIM" userId="afa2f7115fd23738" providerId="LiveId" clId="{81A18545-CA98-456E-A82F-B31D95D1B123}" dt="2024-11-14T08:04:05.391" v="9" actId="1076"/>
+        <pc:sldMkLst>
+          <pc:docMk/>
+          <pc:sldMk cId="4071252851" sldId="415"/>
+        </pc:sldMkLst>
+        <pc:picChg chg="add mod">
+          <ac:chgData name="JISAN KIM" userId="afa2f7115fd23738" providerId="LiveId" clId="{81A18545-CA98-456E-A82F-B31D95D1B123}" dt="2024-11-14T08:04:05.391" v="9" actId="1076"/>
+          <ac:picMkLst>
+            <pc:docMk/>
+            <pc:sldMk cId="4071252851" sldId="415"/>
+            <ac:picMk id="3" creationId="{96A8FF68-3630-18E8-8410-C3CA5CE5BBB4}"/>
+          </ac:picMkLst>
+        </pc:picChg>
+        <pc:picChg chg="del">
+          <ac:chgData name="JISAN KIM" userId="afa2f7115fd23738" providerId="LiveId" clId="{81A18545-CA98-456E-A82F-B31D95D1B123}" dt="2024-11-14T08:03:55.371" v="5" actId="478"/>
+          <ac:picMkLst>
+            <pc:docMk/>
+            <pc:sldMk cId="4071252851" sldId="415"/>
+            <ac:picMk id="9" creationId="{67820C31-6B29-0C9E-F2F9-DCD5CD32EE2E}"/>
+          </ac:picMkLst>
+        </pc:picChg>
+      </pc:sldChg>
+      <pc:sldChg chg="addSp delSp modSp mod">
+        <pc:chgData name="JISAN KIM" userId="afa2f7115fd23738" providerId="LiveId" clId="{81A18545-CA98-456E-A82F-B31D95D1B123}" dt="2024-11-14T08:06:03.415" v="81" actId="1076"/>
+        <pc:sldMkLst>
+          <pc:docMk/>
+          <pc:sldMk cId="1190513628" sldId="439"/>
+        </pc:sldMkLst>
+        <pc:spChg chg="mod">
+          <ac:chgData name="JISAN KIM" userId="afa2f7115fd23738" providerId="LiveId" clId="{81A18545-CA98-456E-A82F-B31D95D1B123}" dt="2024-11-14T08:05:17.095" v="74" actId="20577"/>
+          <ac:spMkLst>
+            <pc:docMk/>
+            <pc:sldMk cId="1190513628" sldId="439"/>
+            <ac:spMk id="11" creationId="{553631C5-9B03-272A-BD7C-9AB795CA4B9D}"/>
+          </ac:spMkLst>
+        </pc:spChg>
+        <pc:spChg chg="mod">
+          <ac:chgData name="JISAN KIM" userId="afa2f7115fd23738" providerId="LiveId" clId="{81A18545-CA98-456E-A82F-B31D95D1B123}" dt="2024-11-14T08:06:03.415" v="81" actId="1076"/>
+          <ac:spMkLst>
+            <pc:docMk/>
+            <pc:sldMk cId="1190513628" sldId="439"/>
+            <ac:spMk id="12" creationId="{B5C5A45A-571C-EBA2-3E50-4B1369C7579E}"/>
+          </ac:spMkLst>
+        </pc:spChg>
+        <pc:picChg chg="del">
+          <ac:chgData name="JISAN KIM" userId="afa2f7115fd23738" providerId="LiveId" clId="{81A18545-CA98-456E-A82F-B31D95D1B123}" dt="2024-11-14T08:04:25.693" v="10" actId="478"/>
+          <ac:picMkLst>
+            <pc:docMk/>
+            <pc:sldMk cId="1190513628" sldId="439"/>
+            <ac:picMk id="3" creationId="{E286666E-223B-E42F-F9BB-961217EB66EB}"/>
+          </ac:picMkLst>
+        </pc:picChg>
+        <pc:picChg chg="add mod modCrop">
+          <ac:chgData name="JISAN KIM" userId="afa2f7115fd23738" providerId="LiveId" clId="{81A18545-CA98-456E-A82F-B31D95D1B123}" dt="2024-11-14T08:04:50.630" v="15" actId="14100"/>
+          <ac:picMkLst>
+            <pc:docMk/>
+            <pc:sldMk cId="1190513628" sldId="439"/>
+            <ac:picMk id="5" creationId="{4016D542-A6EC-7EE6-BBB3-B2B953C6D0CB}"/>
+          </ac:picMkLst>
+        </pc:picChg>
+        <pc:picChg chg="del">
+          <ac:chgData name="JISAN KIM" userId="afa2f7115fd23738" providerId="LiveId" clId="{81A18545-CA98-456E-A82F-B31D95D1B123}" dt="2024-11-14T08:05:40.302" v="75" actId="478"/>
+          <ac:picMkLst>
+            <pc:docMk/>
+            <pc:sldMk cId="1190513628" sldId="439"/>
+            <ac:picMk id="7" creationId="{78A2C63B-C983-B595-8AA8-BA4D7D767877}"/>
+          </ac:picMkLst>
+        </pc:picChg>
+        <pc:picChg chg="add mod">
+          <ac:chgData name="JISAN KIM" userId="afa2f7115fd23738" providerId="LiveId" clId="{81A18545-CA98-456E-A82F-B31D95D1B123}" dt="2024-11-14T08:05:45.281" v="77" actId="1076"/>
+          <ac:picMkLst>
+            <pc:docMk/>
+            <pc:sldMk cId="1190513628" sldId="439"/>
+            <ac:picMk id="8" creationId="{7D676C25-3022-F941-0044-F0D6FD57A36C}"/>
+          </ac:picMkLst>
+        </pc:picChg>
+      </pc:sldChg>
+    </pc:docChg>
+  </pc:docChgLst>
   <pc:docChgLst>
     <pc:chgData name="JISAN KIM" userId="afa2f7115fd23738" providerId="LiveId" clId="{7AA45BCF-42B2-4DF9-9501-9DE1F64E013C}"/>
     <pc:docChg chg="undo redo custSel addSld delSld modSld">
@@ -1711,7 +1821,7 @@
           <a:p>
             <a:fld id="{4CFC31CF-C209-45DD-92E6-39C7CDE9F696}" type="datetimeFigureOut">
               <a:rPr lang="ko-KR" altLang="en-US" smtClean="0"/>
-              <a:t>2024-11-13</a:t>
+              <a:t>2024-11-14</a:t>
             </a:fld>
             <a:endParaRPr lang="ko-KR" altLang="en-US"/>
           </a:p>
@@ -3326,7 +3436,7 @@
           <a:p>
             <a:fld id="{22895D34-D68D-42F6-BAE0-20973CEBBAD2}" type="datetime1">
               <a:rPr lang="ko-KR" altLang="en-US" smtClean="0"/>
-              <a:t>2024-11-13</a:t>
+              <a:t>2024-11-14</a:t>
             </a:fld>
             <a:endParaRPr lang="ko-KR" altLang="en-US"/>
           </a:p>
@@ -3496,7 +3606,7 @@
           <a:p>
             <a:fld id="{EE90CF76-970C-4D51-83E0-DAD5C1736A83}" type="datetime1">
               <a:rPr lang="ko-KR" altLang="en-US" smtClean="0"/>
-              <a:t>2024-11-13</a:t>
+              <a:t>2024-11-14</a:t>
             </a:fld>
             <a:endParaRPr lang="ko-KR" altLang="en-US"/>
           </a:p>
@@ -3681,7 +3791,7 @@
           <a:p>
             <a:fld id="{9900650B-889C-4160-B707-48654F261357}" type="datetime1">
               <a:rPr lang="ko-KR" altLang="en-US" smtClean="0"/>
-              <a:t>2024-11-13</a:t>
+              <a:t>2024-11-14</a:t>
             </a:fld>
             <a:endParaRPr lang="ko-KR" altLang="en-US"/>
           </a:p>
@@ -3856,7 +3966,7 @@
           <a:p>
             <a:fld id="{84DE8C09-54C4-4FE6-A403-72190ACC5E43}" type="datetime1">
               <a:rPr lang="ko-KR" altLang="en-US" smtClean="0"/>
-              <a:t>2024-11-13</a:t>
+              <a:t>2024-11-14</a:t>
             </a:fld>
             <a:endParaRPr lang="ko-KR" altLang="en-US"/>
           </a:p>
@@ -4100,7 +4210,7 @@
           <a:p>
             <a:fld id="{AFC09797-F8D0-4F09-84FB-BAFD991391C6}" type="datetime1">
               <a:rPr lang="ko-KR" altLang="en-US" smtClean="0"/>
-              <a:t>2024-11-13</a:t>
+              <a:t>2024-11-14</a:t>
             </a:fld>
             <a:endParaRPr lang="ko-KR" altLang="en-US"/>
           </a:p>
@@ -4332,7 +4442,7 @@
           <a:p>
             <a:fld id="{EE5A8268-1C5C-447A-9087-90EA2F609126}" type="datetime1">
               <a:rPr lang="ko-KR" altLang="en-US" smtClean="0"/>
-              <a:t>2024-11-13</a:t>
+              <a:t>2024-11-14</a:t>
             </a:fld>
             <a:endParaRPr lang="ko-KR" altLang="en-US"/>
           </a:p>
@@ -4699,7 +4809,7 @@
           <a:p>
             <a:fld id="{8F161699-7DEC-4748-B84B-26D338138F12}" type="datetime1">
               <a:rPr lang="ko-KR" altLang="en-US" smtClean="0"/>
-              <a:t>2024-11-13</a:t>
+              <a:t>2024-11-14</a:t>
             </a:fld>
             <a:endParaRPr lang="ko-KR" altLang="en-US"/>
           </a:p>
@@ -4817,7 +4927,7 @@
           <a:p>
             <a:fld id="{FB506333-EEF8-440D-A86D-CDD2F0AF3078}" type="datetime1">
               <a:rPr lang="ko-KR" altLang="en-US" smtClean="0"/>
-              <a:t>2024-11-13</a:t>
+              <a:t>2024-11-14</a:t>
             </a:fld>
             <a:endParaRPr lang="ko-KR" altLang="en-US"/>
           </a:p>
@@ -4917,7 +5027,7 @@
           <a:p>
             <a:fld id="{3161CA01-32BA-43E2-9ABF-84F8B0644982}" type="datetime1">
               <a:rPr lang="ko-KR" altLang="en-US" smtClean="0"/>
-              <a:t>2024-11-13</a:t>
+              <a:t>2024-11-14</a:t>
             </a:fld>
             <a:endParaRPr lang="ko-KR" altLang="en-US"/>
           </a:p>
@@ -5199,7 +5309,7 @@
           <a:p>
             <a:fld id="{B49C4273-4D6B-4952-BFCC-453F05286477}" type="datetime1">
               <a:rPr lang="ko-KR" altLang="en-US" smtClean="0"/>
-              <a:t>2024-11-13</a:t>
+              <a:t>2024-11-14</a:t>
             </a:fld>
             <a:endParaRPr lang="ko-KR" altLang="en-US"/>
           </a:p>
@@ -5461,7 +5571,7 @@
           <a:p>
             <a:fld id="{F24DDE7D-9861-431D-B238-8C895D4A33C3}" type="datetime1">
               <a:rPr lang="ko-KR" altLang="en-US" smtClean="0"/>
-              <a:t>2024-11-13</a:t>
+              <a:t>2024-11-14</a:t>
             </a:fld>
             <a:endParaRPr lang="ko-KR" altLang="en-US"/>
           </a:p>
@@ -5679,7 +5789,7 @@
           <a:p>
             <a:fld id="{62B391FA-8B52-439F-8964-2547BDD1DDBC}" type="datetime1">
               <a:rPr lang="ko-KR" altLang="en-US" smtClean="0"/>
-              <a:t>2024-11-13</a:t>
+              <a:t>2024-11-14</a:t>
             </a:fld>
             <a:endParaRPr lang="ko-KR" altLang="en-US"/>
           </a:p>
@@ -6365,10 +6475,10 @@
       </p:sp>
       <p:pic>
         <p:nvPicPr>
-          <p:cNvPr id="13" name="그림 12">
+          <p:cNvPr id="8" name="그림 7">
             <a:extLst>
               <a:ext uri="{FF2B5EF4-FFF2-40B4-BE49-F238E27FC236}">
-                <a16:creationId xmlns:a16="http://schemas.microsoft.com/office/drawing/2014/main" id="{D686DD4E-002F-445F-D796-3D52B1F0B9C4}"/>
+                <a16:creationId xmlns:a16="http://schemas.microsoft.com/office/drawing/2014/main" id="{13BA5FFE-B938-8C95-E552-135575270AA7}"/>
               </a:ext>
             </a:extLst>
           </p:cNvPr>
@@ -6385,8 +6495,8 @@
         </p:blipFill>
         <p:spPr>
           <a:xfrm>
-            <a:off x="1531618" y="1931171"/>
-            <a:ext cx="6842764" cy="3171123"/>
+            <a:off x="1379761" y="1921087"/>
+            <a:ext cx="7429500" cy="3405350"/>
           </a:xfrm>
           <a:prstGeom prst="rect">
             <a:avLst/>
@@ -7170,12 +7280,48 @@
           </a:p>
         </p:txBody>
       </p:sp>
+      <p:sp>
+        <p:nvSpPr>
+          <p:cNvPr id="18" name="TextBox 17">
+            <a:extLst>
+              <a:ext uri="{FF2B5EF4-FFF2-40B4-BE49-F238E27FC236}">
+                <a16:creationId xmlns:a16="http://schemas.microsoft.com/office/drawing/2014/main" id="{A10D68F6-A20B-2B95-02A0-9C65CE286EB8}"/>
+              </a:ext>
+            </a:extLst>
+          </p:cNvPr>
+          <p:cNvSpPr txBox="1"/>
+          <p:nvPr/>
+        </p:nvSpPr>
+        <p:spPr>
+          <a:xfrm>
+            <a:off x="281361" y="5454714"/>
+            <a:ext cx="9343278" cy="707886"/>
+          </a:xfrm>
+          <a:prstGeom prst="rect">
+            <a:avLst/>
+          </a:prstGeom>
+          <a:noFill/>
+        </p:spPr>
+        <p:txBody>
+          <a:bodyPr wrap="square" rtlCol="0">
+            <a:spAutoFit/>
+          </a:bodyPr>
+          <a:lstStyle/>
+          <a:p>
+            <a:r>
+              <a:rPr lang="en-US" altLang="ko-KR" sz="2000" dirty="0"/>
+              <a:t>All the components have been implemented: Header, Footer, Navigation Bar (Home, Data, About), and Main Dashboard.</a:t>
+            </a:r>
+            <a:endParaRPr lang="ko-KR" altLang="en-US" sz="2000" dirty="0"/>
+          </a:p>
+        </p:txBody>
+      </p:sp>
       <p:pic>
         <p:nvPicPr>
-          <p:cNvPr id="9" name="그림 8">
+          <p:cNvPr id="3" name="그림 2">
             <a:extLst>
               <a:ext uri="{FF2B5EF4-FFF2-40B4-BE49-F238E27FC236}">
-                <a16:creationId xmlns:a16="http://schemas.microsoft.com/office/drawing/2014/main" id="{67820C31-6B29-0C9E-F2F9-DCD5CD32EE2E}"/>
+                <a16:creationId xmlns:a16="http://schemas.microsoft.com/office/drawing/2014/main" id="{96A8FF68-3630-18E8-8410-C3CA5CE5BBB4}"/>
               </a:ext>
             </a:extLst>
           </p:cNvPr>
@@ -7192,50 +7338,14 @@
         </p:blipFill>
         <p:spPr>
           <a:xfrm>
-            <a:off x="281361" y="886845"/>
-            <a:ext cx="9343278" cy="4329929"/>
+            <a:off x="299410" y="940796"/>
+            <a:ext cx="9307179" cy="4265994"/>
           </a:xfrm>
           <a:prstGeom prst="rect">
             <a:avLst/>
           </a:prstGeom>
         </p:spPr>
       </p:pic>
-      <p:sp>
-        <p:nvSpPr>
-          <p:cNvPr id="18" name="TextBox 17">
-            <a:extLst>
-              <a:ext uri="{FF2B5EF4-FFF2-40B4-BE49-F238E27FC236}">
-                <a16:creationId xmlns:a16="http://schemas.microsoft.com/office/drawing/2014/main" id="{A10D68F6-A20B-2B95-02A0-9C65CE286EB8}"/>
-              </a:ext>
-            </a:extLst>
-          </p:cNvPr>
-          <p:cNvSpPr txBox="1"/>
-          <p:nvPr/>
-        </p:nvSpPr>
-        <p:spPr>
-          <a:xfrm>
-            <a:off x="281361" y="5454714"/>
-            <a:ext cx="9343278" cy="707886"/>
-          </a:xfrm>
-          <a:prstGeom prst="rect">
-            <a:avLst/>
-          </a:prstGeom>
-          <a:noFill/>
-        </p:spPr>
-        <p:txBody>
-          <a:bodyPr wrap="square" rtlCol="0">
-            <a:spAutoFit/>
-          </a:bodyPr>
-          <a:lstStyle/>
-          <a:p>
-            <a:r>
-              <a:rPr lang="en-US" altLang="ko-KR" sz="2000" dirty="0"/>
-              <a:t>All the components have been implemented: Header, Footer, Navigation Bar (Home, Data, About), and Main Dashboard.</a:t>
-            </a:r>
-            <a:endParaRPr lang="ko-KR" altLang="en-US" sz="2000" dirty="0"/>
-          </a:p>
-        </p:txBody>
-      </p:sp>
     </p:spTree>
     <p:extLst>
       <p:ext uri="{BB962C8B-B14F-4D97-AF65-F5344CB8AC3E}">
@@ -7635,8 +7745,8 @@
         </p:nvSpPr>
         <p:spPr>
           <a:xfrm>
-            <a:off x="5068252" y="944434"/>
-            <a:ext cx="4414803" cy="830997"/>
+            <a:off x="4228342" y="741910"/>
+            <a:ext cx="4414803" cy="1569660"/>
           </a:xfrm>
           <a:prstGeom prst="rect">
             <a:avLst/>
@@ -7651,7 +7761,59 @@
           <a:p>
             <a:r>
               <a:rPr lang="en-US" altLang="ko-KR" sz="2400" dirty="0"/>
-              <a:t>Each options take a user to dedicated section of the page.</a:t>
+              <a:t>The footer contains the navigation bar. Each options take a user to dedicated section of the page.</a:t>
+            </a:r>
+            <a:endParaRPr lang="ko-KR" altLang="en-US" sz="2400" dirty="0"/>
+          </a:p>
+        </p:txBody>
+      </p:sp>
+      <p:sp>
+        <p:nvSpPr>
+          <p:cNvPr id="12" name="TextBox 11">
+            <a:extLst>
+              <a:ext uri="{FF2B5EF4-FFF2-40B4-BE49-F238E27FC236}">
+                <a16:creationId xmlns:a16="http://schemas.microsoft.com/office/drawing/2014/main" id="{B5C5A45A-571C-EBA2-3E50-4B1369C7579E}"/>
+              </a:ext>
+            </a:extLst>
+          </p:cNvPr>
+          <p:cNvSpPr txBox="1"/>
+          <p:nvPr/>
+        </p:nvSpPr>
+        <p:spPr>
+          <a:xfrm>
+            <a:off x="6629399" y="3210636"/>
+            <a:ext cx="3097531" cy="1938992"/>
+          </a:xfrm>
+          <a:prstGeom prst="rect">
+            <a:avLst/>
+          </a:prstGeom>
+          <a:noFill/>
+        </p:spPr>
+        <p:txBody>
+          <a:bodyPr wrap="square" rtlCol="0">
+            <a:spAutoFit/>
+          </a:bodyPr>
+          <a:lstStyle/>
+          <a:p>
+            <a:r>
+              <a:rPr lang="en-US" altLang="ko-KR" sz="2400" dirty="0"/>
+              <a:t>Implemented with &lt;nav&gt;</a:t>
+            </a:r>
+            <a:r>
+              <a:rPr lang="ko-KR" altLang="en-US" sz="2400" dirty="0"/>
+              <a:t> </a:t>
+            </a:r>
+            <a:r>
+              <a:rPr lang="en-US" altLang="ko-KR" sz="2400" dirty="0"/>
+              <a:t>and</a:t>
+            </a:r>
+            <a:r>
+              <a:rPr lang="ko-KR" altLang="en-US" sz="2400" dirty="0"/>
+              <a:t> </a:t>
+            </a:r>
+            <a:r>
+              <a:rPr lang="en-US" altLang="ko-KR" sz="2400" dirty="0"/>
+              <a:t>&lt;section&gt;. The scroll moves to each point by clicking the options.</a:t>
             </a:r>
             <a:endParaRPr lang="ko-KR" altLang="en-US" sz="2400" dirty="0"/>
           </a:p>
@@ -7659,10 +7821,10 @@
       </p:sp>
       <p:pic>
         <p:nvPicPr>
-          <p:cNvPr id="3" name="그림 2">
+          <p:cNvPr id="5" name="그림 4">
             <a:extLst>
               <a:ext uri="{FF2B5EF4-FFF2-40B4-BE49-F238E27FC236}">
-                <a16:creationId xmlns:a16="http://schemas.microsoft.com/office/drawing/2014/main" id="{E286666E-223B-E42F-F9BB-961217EB66EB}"/>
+                <a16:creationId xmlns:a16="http://schemas.microsoft.com/office/drawing/2014/main" id="{4016D542-A6EC-7EE6-BBB3-B2B953C6D0CB}"/>
               </a:ext>
             </a:extLst>
           </p:cNvPr>
@@ -7673,13 +7835,13 @@
         </p:nvPicPr>
         <p:blipFill>
           <a:blip r:embed="rId3"/>
-          <a:srcRect l="41029" t="17530" r="41233" b="63462"/>
+          <a:srcRect l="41890" t="77845" r="39327"/>
           <a:stretch/>
         </p:blipFill>
         <p:spPr>
           <a:xfrm>
-            <a:off x="320039" y="944434"/>
-            <a:ext cx="4414804" cy="2192177"/>
+            <a:off x="320039" y="741910"/>
+            <a:ext cx="3574893" cy="1932709"/>
           </a:xfrm>
           <a:prstGeom prst="rect">
             <a:avLst/>
@@ -7688,10 +7850,10 @@
       </p:pic>
       <p:pic>
         <p:nvPicPr>
-          <p:cNvPr id="7" name="그림 6">
+          <p:cNvPr id="8" name="그림 7">
             <a:extLst>
               <a:ext uri="{FF2B5EF4-FFF2-40B4-BE49-F238E27FC236}">
-                <a16:creationId xmlns:a16="http://schemas.microsoft.com/office/drawing/2014/main" id="{78A2C63B-C983-B595-8AA8-BA4D7D767877}"/>
+                <a16:creationId xmlns:a16="http://schemas.microsoft.com/office/drawing/2014/main" id="{7D676C25-3022-F941-0044-F0D6FD57A36C}"/>
               </a:ext>
             </a:extLst>
           </p:cNvPr>
@@ -7708,66 +7870,14 @@
         </p:blipFill>
         <p:spPr>
           <a:xfrm>
-            <a:off x="320039" y="3136610"/>
-            <a:ext cx="5567416" cy="3572533"/>
+            <a:off x="320039" y="3210636"/>
+            <a:ext cx="6173061" cy="2991267"/>
           </a:xfrm>
           <a:prstGeom prst="rect">
             <a:avLst/>
           </a:prstGeom>
         </p:spPr>
       </p:pic>
-      <p:sp>
-        <p:nvSpPr>
-          <p:cNvPr id="12" name="TextBox 11">
-            <a:extLst>
-              <a:ext uri="{FF2B5EF4-FFF2-40B4-BE49-F238E27FC236}">
-                <a16:creationId xmlns:a16="http://schemas.microsoft.com/office/drawing/2014/main" id="{B5C5A45A-571C-EBA2-3E50-4B1369C7579E}"/>
-              </a:ext>
-            </a:extLst>
-          </p:cNvPr>
-          <p:cNvSpPr txBox="1"/>
-          <p:nvPr/>
-        </p:nvSpPr>
-        <p:spPr>
-          <a:xfrm>
-            <a:off x="5978407" y="3136610"/>
-            <a:ext cx="3839964" cy="1569660"/>
-          </a:xfrm>
-          <a:prstGeom prst="rect">
-            <a:avLst/>
-          </a:prstGeom>
-          <a:noFill/>
-        </p:spPr>
-        <p:txBody>
-          <a:bodyPr wrap="square" rtlCol="0">
-            <a:spAutoFit/>
-          </a:bodyPr>
-          <a:lstStyle/>
-          <a:p>
-            <a:r>
-              <a:rPr lang="en-US" altLang="ko-KR" sz="2400" dirty="0"/>
-              <a:t>Implemented with &lt;nav&gt;</a:t>
-            </a:r>
-            <a:r>
-              <a:rPr lang="ko-KR" altLang="en-US" sz="2400" dirty="0"/>
-              <a:t> </a:t>
-            </a:r>
-            <a:r>
-              <a:rPr lang="en-US" altLang="ko-KR" sz="2400" dirty="0"/>
-              <a:t>and</a:t>
-            </a:r>
-            <a:r>
-              <a:rPr lang="ko-KR" altLang="en-US" sz="2400" dirty="0"/>
-              <a:t> </a:t>
-            </a:r>
-            <a:r>
-              <a:rPr lang="en-US" altLang="ko-KR" sz="2400" dirty="0"/>
-              <a:t>&lt;section&gt;. The scroll moves to each point by clicking the options.</a:t>
-            </a:r>
-            <a:endParaRPr lang="ko-KR" altLang="en-US" sz="2400" dirty="0"/>
-          </a:p>
-        </p:txBody>
-      </p:sp>
     </p:spTree>
     <p:extLst>
       <p:ext uri="{BB962C8B-B14F-4D97-AF65-F5344CB8AC3E}">

</xml_diff>

<commit_message>
Added Future plan to the presentation file
</commit_message>
<xml_diff>
--- a/Web_Application_Programming_FinalProject_Presentation_201821181_JisanKim.pptx
+++ b/Web_Application_Programming_FinalProject_Presentation_201821181_JisanKim.pptx
@@ -5,7 +5,7 @@
     <p:sldMasterId id="2147483660" r:id="rId1"/>
   </p:sldMasterIdLst>
   <p:notesMasterIdLst>
-    <p:notesMasterId r:id="rId13"/>
+    <p:notesMasterId r:id="rId14"/>
   </p:notesMasterIdLst>
   <p:sldIdLst>
     <p:sldId id="258" r:id="rId2"/>
@@ -18,7 +18,8 @@
     <p:sldId id="441" r:id="rId9"/>
     <p:sldId id="442" r:id="rId10"/>
     <p:sldId id="414" r:id="rId11"/>
-    <p:sldId id="375" r:id="rId12"/>
+    <p:sldId id="443" r:id="rId12"/>
+    <p:sldId id="375" r:id="rId13"/>
   </p:sldIdLst>
   <p:sldSz cx="9906000" cy="6858000" type="A4"/>
   <p:notesSz cx="6858000" cy="9144000"/>
@@ -148,7 +149,7 @@
 <file path=ppt/revisionInfo.xml><?xml version="1.0" encoding="utf-8"?>
 <p1510:revInfo xmlns:a="http://schemas.openxmlformats.org/drawingml/2006/main" xmlns:r="http://schemas.openxmlformats.org/officeDocument/2006/relationships" xmlns:p1510="http://schemas.microsoft.com/office/powerpoint/2015/10/main">
   <p1510:revLst>
-    <p1510:client id="{81A18545-CA98-456E-A82F-B31D95D1B123}" v="2" dt="2024-11-14T08:04:27.474"/>
+    <p1510:client id="{81A18545-CA98-456E-A82F-B31D95D1B123}" v="9" dt="2024-11-14T08:26:25.856"/>
   </p1510:revLst>
 </p1510:revInfo>
 </file>
@@ -157,8 +158,8 @@
 <pc:chgInfo xmlns:a="http://schemas.openxmlformats.org/drawingml/2006/main" xmlns:r="http://schemas.openxmlformats.org/officeDocument/2006/relationships" xmlns:ac="http://schemas.microsoft.com/office/drawing/2013/main/command" xmlns:pc="http://schemas.microsoft.com/office/powerpoint/2013/main/command">
   <pc:docChgLst>
     <pc:chgData name="JISAN KIM" userId="afa2f7115fd23738" providerId="LiveId" clId="{81A18545-CA98-456E-A82F-B31D95D1B123}"/>
-    <pc:docChg chg="custSel modSld">
-      <pc:chgData name="JISAN KIM" userId="afa2f7115fd23738" providerId="LiveId" clId="{81A18545-CA98-456E-A82F-B31D95D1B123}" dt="2024-11-14T08:06:03.415" v="81" actId="1076"/>
+    <pc:docChg chg="custSel addSld modSld">
+      <pc:chgData name="JISAN KIM" userId="afa2f7115fd23738" providerId="LiveId" clId="{81A18545-CA98-456E-A82F-B31D95D1B123}" dt="2024-11-14T08:28:59.524" v="537" actId="20577"/>
       <pc:docMkLst>
         <pc:docMk/>
       </pc:docMkLst>
@@ -260,6 +261,101 @@
             <pc:docMk/>
             <pc:sldMk cId="1190513628" sldId="439"/>
             <ac:picMk id="8" creationId="{7D676C25-3022-F941-0044-F0D6FD57A36C}"/>
+          </ac:picMkLst>
+        </pc:picChg>
+      </pc:sldChg>
+      <pc:sldChg chg="addSp delSp modSp add mod">
+        <pc:chgData name="JISAN KIM" userId="afa2f7115fd23738" providerId="LiveId" clId="{81A18545-CA98-456E-A82F-B31D95D1B123}" dt="2024-11-14T08:28:59.524" v="537" actId="20577"/>
+        <pc:sldMkLst>
+          <pc:docMk/>
+          <pc:sldMk cId="1631555138" sldId="443"/>
+        </pc:sldMkLst>
+        <pc:spChg chg="mod">
+          <ac:chgData name="JISAN KIM" userId="afa2f7115fd23738" providerId="LiveId" clId="{81A18545-CA98-456E-A82F-B31D95D1B123}" dt="2024-11-14T08:22:32.194" v="102" actId="20577"/>
+          <ac:spMkLst>
+            <pc:docMk/>
+            <pc:sldMk cId="1631555138" sldId="443"/>
+            <ac:spMk id="3" creationId="{40718EF9-C872-4E9B-78EC-92BEBE5BD3CA}"/>
+          </ac:spMkLst>
+        </pc:spChg>
+        <pc:spChg chg="add mod">
+          <ac:chgData name="JISAN KIM" userId="afa2f7115fd23738" providerId="LiveId" clId="{81A18545-CA98-456E-A82F-B31D95D1B123}" dt="2024-11-14T08:23:31.231" v="148" actId="1076"/>
+          <ac:spMkLst>
+            <pc:docMk/>
+            <pc:sldMk cId="1631555138" sldId="443"/>
+            <ac:spMk id="5" creationId="{AABCA50C-74E2-D229-9B6B-629B64B6DD2A}"/>
+          </ac:spMkLst>
+        </pc:spChg>
+        <pc:spChg chg="add mod">
+          <ac:chgData name="JISAN KIM" userId="afa2f7115fd23738" providerId="LiveId" clId="{81A18545-CA98-456E-A82F-B31D95D1B123}" dt="2024-11-14T08:24:25.953" v="263" actId="20577"/>
+          <ac:spMkLst>
+            <pc:docMk/>
+            <pc:sldMk cId="1631555138" sldId="443"/>
+            <ac:spMk id="6" creationId="{7E4327D3-2E03-589C-0F1F-6B5DA75FF135}"/>
+          </ac:spMkLst>
+        </pc:spChg>
+        <pc:spChg chg="del">
+          <ac:chgData name="JISAN KIM" userId="afa2f7115fd23738" providerId="LiveId" clId="{81A18545-CA98-456E-A82F-B31D95D1B123}" dt="2024-11-14T08:22:35.936" v="103" actId="478"/>
+          <ac:spMkLst>
+            <pc:docMk/>
+            <pc:sldMk cId="1631555138" sldId="443"/>
+            <ac:spMk id="9" creationId="{C5F3B343-DF6F-B6F9-CF5D-2035BCD22704}"/>
+          </ac:spMkLst>
+        </pc:spChg>
+        <pc:spChg chg="add mod">
+          <ac:chgData name="JISAN KIM" userId="afa2f7115fd23738" providerId="LiveId" clId="{81A18545-CA98-456E-A82F-B31D95D1B123}" dt="2024-11-14T08:27:04.997" v="313" actId="20577"/>
+          <ac:spMkLst>
+            <pc:docMk/>
+            <pc:sldMk cId="1631555138" sldId="443"/>
+            <ac:spMk id="10" creationId="{281E16A6-1266-BA84-0FCC-6229EC4CBDF3}"/>
+          </ac:spMkLst>
+        </pc:spChg>
+        <pc:spChg chg="add mod">
+          <ac:chgData name="JISAN KIM" userId="afa2f7115fd23738" providerId="LiveId" clId="{81A18545-CA98-456E-A82F-B31D95D1B123}" dt="2024-11-14T08:28:59.524" v="537" actId="20577"/>
+          <ac:spMkLst>
+            <pc:docMk/>
+            <pc:sldMk cId="1631555138" sldId="443"/>
+            <ac:spMk id="11" creationId="{592BB97D-B076-C2CF-458A-3237C1B227A6}"/>
+          </ac:spMkLst>
+        </pc:spChg>
+        <pc:picChg chg="add mod">
+          <ac:chgData name="JISAN KIM" userId="afa2f7115fd23738" providerId="LiveId" clId="{81A18545-CA98-456E-A82F-B31D95D1B123}" dt="2024-11-14T08:22:48.826" v="105" actId="14100"/>
+          <ac:picMkLst>
+            <pc:docMk/>
+            <pc:sldMk cId="1631555138" sldId="443"/>
+            <ac:picMk id="4" creationId="{4B2EE6CE-F815-0DCF-7EC6-483F9108C6D5}"/>
+          </ac:picMkLst>
+        </pc:picChg>
+        <pc:picChg chg="del">
+          <ac:chgData name="JISAN KIM" userId="afa2f7115fd23738" providerId="LiveId" clId="{81A18545-CA98-456E-A82F-B31D95D1B123}" dt="2024-11-14T08:22:35.936" v="103" actId="478"/>
+          <ac:picMkLst>
+            <pc:docMk/>
+            <pc:sldMk cId="1631555138" sldId="443"/>
+            <ac:picMk id="7" creationId="{3024F737-E588-3B9B-9261-80C107743C28}"/>
+          </ac:picMkLst>
+        </pc:picChg>
+        <pc:picChg chg="add mod">
+          <ac:chgData name="JISAN KIM" userId="afa2f7115fd23738" providerId="LiveId" clId="{81A18545-CA98-456E-A82F-B31D95D1B123}" dt="2024-11-14T08:26:14.433" v="266" actId="1076"/>
+          <ac:picMkLst>
+            <pc:docMk/>
+            <pc:sldMk cId="1631555138" sldId="443"/>
+            <ac:picMk id="8" creationId="{6D7F8F30-DC30-6FF7-A4CE-F43161259C60}"/>
+          </ac:picMkLst>
+        </pc:picChg>
+        <pc:picChg chg="del">
+          <ac:chgData name="JISAN KIM" userId="afa2f7115fd23738" providerId="LiveId" clId="{81A18545-CA98-456E-A82F-B31D95D1B123}" dt="2024-11-14T08:22:35.936" v="103" actId="478"/>
+          <ac:picMkLst>
+            <pc:docMk/>
+            <pc:sldMk cId="1631555138" sldId="443"/>
+            <ac:picMk id="16" creationId="{037BB578-2C72-B7A3-756F-86BDCCB0E512}"/>
+          </ac:picMkLst>
+        </pc:picChg>
+        <pc:picChg chg="del">
+          <ac:chgData name="JISAN KIM" userId="afa2f7115fd23738" providerId="LiveId" clId="{81A18545-CA98-456E-A82F-B31D95D1B123}" dt="2024-11-14T08:22:35.936" v="103" actId="478"/>
+          <ac:picMkLst>
+            <pc:docMk/>
+            <pc:sldMk cId="1631555138" sldId="443"/>
+            <ac:picMk id="18" creationId="{43C2EAC1-7E98-3813-42C8-C11447CFFAED}"/>
           </ac:picMkLst>
         </pc:picChg>
       </pc:sldChg>
@@ -2324,6 +2420,177 @@
   <p:cSld>
     <p:spTree>
       <p:nvGrpSpPr>
+        <p:cNvPr id="1" name="">
+          <a:extLst>
+            <a:ext uri="{FF2B5EF4-FFF2-40B4-BE49-F238E27FC236}">
+              <a16:creationId xmlns:a16="http://schemas.microsoft.com/office/drawing/2014/main" id="{3817EFAC-9FFF-12D0-1F87-0D816231B525}"/>
+            </a:ext>
+          </a:extLst>
+        </p:cNvPr>
+        <p:cNvGrpSpPr/>
+        <p:nvPr/>
+      </p:nvGrpSpPr>
+      <p:grpSpPr>
+        <a:xfrm>
+          <a:off x="0" y="0"/>
+          <a:ext cx="0" cy="0"/>
+          <a:chOff x="0" y="0"/>
+          <a:chExt cx="0" cy="0"/>
+        </a:xfrm>
+      </p:grpSpPr>
+      <p:sp>
+        <p:nvSpPr>
+          <p:cNvPr id="2" name="슬라이드 이미지 개체 틀 1">
+            <a:extLst>
+              <a:ext uri="{FF2B5EF4-FFF2-40B4-BE49-F238E27FC236}">
+                <a16:creationId xmlns:a16="http://schemas.microsoft.com/office/drawing/2014/main" id="{FC958FB6-EFA9-6900-E83F-8A9B45DABF71}"/>
+              </a:ext>
+            </a:extLst>
+          </p:cNvPr>
+          <p:cNvSpPr>
+            <a:spLocks noGrp="1" noRot="1" noChangeAspect="1"/>
+          </p:cNvSpPr>
+          <p:nvPr>
+            <p:ph type="sldImg"/>
+          </p:nvPr>
+        </p:nvSpPr>
+        <p:spPr/>
+      </p:sp>
+      <p:sp>
+        <p:nvSpPr>
+          <p:cNvPr id="3" name="슬라이드 노트 개체 틀 2">
+            <a:extLst>
+              <a:ext uri="{FF2B5EF4-FFF2-40B4-BE49-F238E27FC236}">
+                <a16:creationId xmlns:a16="http://schemas.microsoft.com/office/drawing/2014/main" id="{03EE16E0-CB95-8137-3B37-432DD198AEF6}"/>
+              </a:ext>
+            </a:extLst>
+          </p:cNvPr>
+          <p:cNvSpPr>
+            <a:spLocks noGrp="1"/>
+          </p:cNvSpPr>
+          <p:nvPr>
+            <p:ph type="body" idx="1"/>
+          </p:nvPr>
+        </p:nvSpPr>
+        <p:spPr/>
+        <p:txBody>
+          <a:bodyPr/>
+          <a:lstStyle/>
+          <a:p>
+            <a:pPr algn="l"/>
+            <a:r>
+              <a:rPr lang="en-US" altLang="ko-KR" sz="2800" b="0" i="0">
+                <a:solidFill>
+                  <a:srgbClr val="D1D5DB"/>
+                </a:solidFill>
+                <a:effectLst/>
+                <a:latin typeface="Söhne"/>
+              </a:rPr>
+              <a:t>The manufacturing process is also a problem for many of these methods.</a:t>
+            </a:r>
+          </a:p>
+          <a:p>
+            <a:pPr algn="l"/>
+            <a:endParaRPr lang="en-US" altLang="ko-KR" sz="2800" b="0" i="0">
+              <a:solidFill>
+                <a:srgbClr val="D1D5DB"/>
+              </a:solidFill>
+              <a:effectLst/>
+              <a:latin typeface="Söhne"/>
+            </a:endParaRPr>
+          </a:p>
+          <a:p>
+            <a:pPr algn="l"/>
+            <a:r>
+              <a:rPr lang="en-US" altLang="ko-KR" sz="2800" b="0" i="0">
+                <a:solidFill>
+                  <a:srgbClr val="D1D5DB"/>
+                </a:solidFill>
+                <a:effectLst/>
+                <a:latin typeface="Söhne"/>
+              </a:rPr>
+              <a:t>They are not designed to be easily made, and sometimes they need special materials that are hard to get in large amounts.</a:t>
+            </a:r>
+          </a:p>
+          <a:p>
+            <a:pPr algn="l"/>
+            <a:endParaRPr lang="en-US" altLang="ko-KR" sz="2800" b="0" i="0">
+              <a:solidFill>
+                <a:srgbClr val="D1D5DB"/>
+              </a:solidFill>
+              <a:effectLst/>
+              <a:latin typeface="Söhne"/>
+            </a:endParaRPr>
+          </a:p>
+          <a:p>
+            <a:pPr algn="l"/>
+            <a:r>
+              <a:rPr lang="en-US" altLang="ko-KR" sz="2800" b="0" i="0">
+                <a:solidFill>
+                  <a:srgbClr val="D1D5DB"/>
+                </a:solidFill>
+                <a:effectLst/>
+                <a:latin typeface="Söhne"/>
+              </a:rPr>
+              <a:t>All these things together mean that these methods can not be made in big numbers at a reasonable cost, making them not so practical for widespread use.</a:t>
+            </a:r>
+            <a:endParaRPr lang="en-US" altLang="ko-KR" sz="2800" b="0" i="0" dirty="0">
+              <a:solidFill>
+                <a:srgbClr val="D1D5DB"/>
+              </a:solidFill>
+              <a:effectLst/>
+              <a:latin typeface="Söhne"/>
+            </a:endParaRPr>
+          </a:p>
+        </p:txBody>
+      </p:sp>
+      <p:sp>
+        <p:nvSpPr>
+          <p:cNvPr id="4" name="슬라이드 번호 개체 틀 3">
+            <a:extLst>
+              <a:ext uri="{FF2B5EF4-FFF2-40B4-BE49-F238E27FC236}">
+                <a16:creationId xmlns:a16="http://schemas.microsoft.com/office/drawing/2014/main" id="{53975884-0115-AAED-962E-271A1E3B0F23}"/>
+              </a:ext>
+            </a:extLst>
+          </p:cNvPr>
+          <p:cNvSpPr>
+            <a:spLocks noGrp="1"/>
+          </p:cNvSpPr>
+          <p:nvPr>
+            <p:ph type="sldNum" sz="quarter" idx="5"/>
+          </p:nvPr>
+        </p:nvSpPr>
+        <p:spPr/>
+        <p:txBody>
+          <a:bodyPr/>
+          <a:lstStyle/>
+          <a:p>
+            <a:fld id="{CEDF3CE0-CFE8-42C0-962F-966571F77612}" type="slidenum">
+              <a:rPr lang="ko-KR" altLang="en-US" smtClean="0"/>
+              <a:t>11</a:t>
+            </a:fld>
+            <a:endParaRPr lang="ko-KR" altLang="en-US"/>
+          </a:p>
+        </p:txBody>
+      </p:sp>
+    </p:spTree>
+    <p:extLst>
+      <p:ext uri="{BB962C8B-B14F-4D97-AF65-F5344CB8AC3E}">
+        <p14:creationId xmlns:p14="http://schemas.microsoft.com/office/powerpoint/2010/main" val="2585583752"/>
+      </p:ext>
+    </p:extLst>
+  </p:cSld>
+  <p:clrMapOvr>
+    <a:masterClrMapping/>
+  </p:clrMapOvr>
+</p:notes>
+</file>
+
+<file path=ppt/notesSlides/notesSlide12.xml><?xml version="1.0" encoding="utf-8"?>
+<p:notes xmlns:a="http://schemas.openxmlformats.org/drawingml/2006/main" xmlns:r="http://schemas.openxmlformats.org/officeDocument/2006/relationships" xmlns:p="http://schemas.openxmlformats.org/presentationml/2006/main">
+  <p:cSld>
+    <p:spTree>
+      <p:nvGrpSpPr>
         <p:cNvPr id="1" name=""/>
         <p:cNvGrpSpPr/>
         <p:nvPr/>
@@ -2415,7 +2682,7 @@
           <a:p>
             <a:fld id="{CEDF3CE0-CFE8-42C0-962F-966571F77612}" type="slidenum">
               <a:rPr lang="ko-KR" altLang="en-US" smtClean="0"/>
-              <a:t>11</a:t>
+              <a:t>12</a:t>
             </a:fld>
             <a:endParaRPr lang="ko-KR" altLang="en-US"/>
           </a:p>
@@ -6746,6 +7013,319 @@
   <p:cSld>
     <p:spTree>
       <p:nvGrpSpPr>
+        <p:cNvPr id="1" name="">
+          <a:extLst>
+            <a:ext uri="{FF2B5EF4-FFF2-40B4-BE49-F238E27FC236}">
+              <a16:creationId xmlns:a16="http://schemas.microsoft.com/office/drawing/2014/main" id="{810A4EE9-091C-F5AE-4890-41839954C9F0}"/>
+            </a:ext>
+          </a:extLst>
+        </p:cNvPr>
+        <p:cNvGrpSpPr/>
+        <p:nvPr/>
+      </p:nvGrpSpPr>
+      <p:grpSpPr>
+        <a:xfrm>
+          <a:off x="0" y="0"/>
+          <a:ext cx="0" cy="0"/>
+          <a:chOff x="0" y="0"/>
+          <a:chExt cx="0" cy="0"/>
+        </a:xfrm>
+      </p:grpSpPr>
+      <p:sp>
+        <p:nvSpPr>
+          <p:cNvPr id="2" name="Slide Number Placeholder 1">
+            <a:extLst>
+              <a:ext uri="{FF2B5EF4-FFF2-40B4-BE49-F238E27FC236}">
+                <a16:creationId xmlns:a16="http://schemas.microsoft.com/office/drawing/2014/main" id="{3855A5E1-F328-FF0F-E63C-A235E48565EF}"/>
+              </a:ext>
+            </a:extLst>
+          </p:cNvPr>
+          <p:cNvSpPr>
+            <a:spLocks noGrp="1"/>
+          </p:cNvSpPr>
+          <p:nvPr>
+            <p:ph type="sldNum" sz="quarter" idx="12"/>
+          </p:nvPr>
+        </p:nvSpPr>
+        <p:spPr/>
+        <p:txBody>
+          <a:bodyPr/>
+          <a:lstStyle/>
+          <a:p>
+            <a:fld id="{84F9B66E-A506-4F32-84E5-F344782BD9BA}" type="slidenum">
+              <a:rPr lang="ko-KR" altLang="en-US" smtClean="0"/>
+              <a:t>11</a:t>
+            </a:fld>
+            <a:endParaRPr lang="ko-KR" altLang="en-US" dirty="0"/>
+          </a:p>
+        </p:txBody>
+      </p:sp>
+      <p:sp>
+        <p:nvSpPr>
+          <p:cNvPr id="3" name="TextBox 2">
+            <a:extLst>
+              <a:ext uri="{FF2B5EF4-FFF2-40B4-BE49-F238E27FC236}">
+                <a16:creationId xmlns:a16="http://schemas.microsoft.com/office/drawing/2014/main" id="{40718EF9-C872-4E9B-78EC-92BEBE5BD3CA}"/>
+              </a:ext>
+            </a:extLst>
+          </p:cNvPr>
+          <p:cNvSpPr txBox="1"/>
+          <p:nvPr/>
+        </p:nvSpPr>
+        <p:spPr>
+          <a:xfrm>
+            <a:off x="114300" y="79274"/>
+            <a:ext cx="1875835" cy="461665"/>
+          </a:xfrm>
+          <a:prstGeom prst="rect">
+            <a:avLst/>
+          </a:prstGeom>
+          <a:noFill/>
+          <a:ln>
+            <a:solidFill>
+              <a:schemeClr val="tx1"/>
+            </a:solidFill>
+          </a:ln>
+        </p:spPr>
+        <p:txBody>
+          <a:bodyPr wrap="none" rtlCol="0">
+            <a:spAutoFit/>
+          </a:bodyPr>
+          <a:lstStyle/>
+          <a:p>
+            <a:r>
+              <a:rPr lang="en-US" altLang="ko-KR" sz="2400" b="1" dirty="0"/>
+              <a:t>Future Plan</a:t>
+            </a:r>
+          </a:p>
+        </p:txBody>
+      </p:sp>
+      <p:pic>
+        <p:nvPicPr>
+          <p:cNvPr id="4" name="그림 3">
+            <a:extLst>
+              <a:ext uri="{FF2B5EF4-FFF2-40B4-BE49-F238E27FC236}">
+                <a16:creationId xmlns:a16="http://schemas.microsoft.com/office/drawing/2014/main" id="{4B2EE6CE-F815-0DCF-7EC6-483F9108C6D5}"/>
+              </a:ext>
+            </a:extLst>
+          </p:cNvPr>
+          <p:cNvPicPr>
+            <a:picLocks noChangeAspect="1"/>
+          </p:cNvPicPr>
+          <p:nvPr/>
+        </p:nvPicPr>
+        <p:blipFill>
+          <a:blip r:embed="rId3"/>
+          <a:stretch>
+            <a:fillRect/>
+          </a:stretch>
+        </p:blipFill>
+        <p:spPr>
+          <a:xfrm>
+            <a:off x="271088" y="917992"/>
+            <a:ext cx="4310053" cy="2511008"/>
+          </a:xfrm>
+          <a:prstGeom prst="rect">
+            <a:avLst/>
+          </a:prstGeom>
+        </p:spPr>
+      </p:pic>
+      <p:sp>
+        <p:nvSpPr>
+          <p:cNvPr id="5" name="TextBox 4">
+            <a:extLst>
+              <a:ext uri="{FF2B5EF4-FFF2-40B4-BE49-F238E27FC236}">
+                <a16:creationId xmlns:a16="http://schemas.microsoft.com/office/drawing/2014/main" id="{AABCA50C-74E2-D229-9B6B-629B64B6DD2A}"/>
+              </a:ext>
+            </a:extLst>
+          </p:cNvPr>
+          <p:cNvSpPr txBox="1"/>
+          <p:nvPr/>
+        </p:nvSpPr>
+        <p:spPr>
+          <a:xfrm>
+            <a:off x="4669934" y="917992"/>
+            <a:ext cx="4121641" cy="584775"/>
+          </a:xfrm>
+          <a:prstGeom prst="rect">
+            <a:avLst/>
+          </a:prstGeom>
+          <a:noFill/>
+        </p:spPr>
+        <p:txBody>
+          <a:bodyPr wrap="none" rtlCol="0">
+            <a:spAutoFit/>
+          </a:bodyPr>
+          <a:lstStyle/>
+          <a:p>
+            <a:r>
+              <a:rPr lang="en-US" altLang="ko-KR" sz="3200" b="1" dirty="0"/>
+              <a:t>Show expected data</a:t>
+            </a:r>
+            <a:endParaRPr lang="ko-KR" altLang="en-US" sz="3200" b="1" dirty="0"/>
+          </a:p>
+        </p:txBody>
+      </p:sp>
+      <p:sp>
+        <p:nvSpPr>
+          <p:cNvPr id="6" name="TextBox 5">
+            <a:extLst>
+              <a:ext uri="{FF2B5EF4-FFF2-40B4-BE49-F238E27FC236}">
+                <a16:creationId xmlns:a16="http://schemas.microsoft.com/office/drawing/2014/main" id="{7E4327D3-2E03-589C-0F1F-6B5DA75FF135}"/>
+              </a:ext>
+            </a:extLst>
+          </p:cNvPr>
+          <p:cNvSpPr txBox="1"/>
+          <p:nvPr/>
+        </p:nvSpPr>
+        <p:spPr>
+          <a:xfrm>
+            <a:off x="4669934" y="1502767"/>
+            <a:ext cx="4414803" cy="1200329"/>
+          </a:xfrm>
+          <a:prstGeom prst="rect">
+            <a:avLst/>
+          </a:prstGeom>
+          <a:noFill/>
+        </p:spPr>
+        <p:txBody>
+          <a:bodyPr wrap="square" rtlCol="0">
+            <a:spAutoFit/>
+          </a:bodyPr>
+          <a:lstStyle/>
+          <a:p>
+            <a:r>
+              <a:rPr lang="en-US" altLang="ko-KR" sz="2400" dirty="0"/>
+              <a:t>Not only indicating weather history, showing future data by clicking a button.</a:t>
+            </a:r>
+            <a:endParaRPr lang="ko-KR" altLang="en-US" sz="2400" dirty="0"/>
+          </a:p>
+        </p:txBody>
+      </p:sp>
+      <p:pic>
+        <p:nvPicPr>
+          <p:cNvPr id="8" name="그림 7">
+            <a:extLst>
+              <a:ext uri="{FF2B5EF4-FFF2-40B4-BE49-F238E27FC236}">
+                <a16:creationId xmlns:a16="http://schemas.microsoft.com/office/drawing/2014/main" id="{6D7F8F30-DC30-6FF7-A4CE-F43161259C60}"/>
+              </a:ext>
+            </a:extLst>
+          </p:cNvPr>
+          <p:cNvPicPr>
+            <a:picLocks noChangeAspect="1"/>
+          </p:cNvPicPr>
+          <p:nvPr/>
+        </p:nvPicPr>
+        <p:blipFill>
+          <a:blip r:embed="rId4"/>
+          <a:stretch>
+            <a:fillRect/>
+          </a:stretch>
+        </p:blipFill>
+        <p:spPr>
+          <a:xfrm>
+            <a:off x="271088" y="4013775"/>
+            <a:ext cx="4653590" cy="2132997"/>
+          </a:xfrm>
+          <a:prstGeom prst="rect">
+            <a:avLst/>
+          </a:prstGeom>
+        </p:spPr>
+      </p:pic>
+      <p:sp>
+        <p:nvSpPr>
+          <p:cNvPr id="10" name="TextBox 9">
+            <a:extLst>
+              <a:ext uri="{FF2B5EF4-FFF2-40B4-BE49-F238E27FC236}">
+                <a16:creationId xmlns:a16="http://schemas.microsoft.com/office/drawing/2014/main" id="{281E16A6-1266-BA84-0FCC-6229EC4CBDF3}"/>
+              </a:ext>
+            </a:extLst>
+          </p:cNvPr>
+          <p:cNvSpPr txBox="1"/>
+          <p:nvPr/>
+        </p:nvSpPr>
+        <p:spPr>
+          <a:xfrm>
+            <a:off x="5057524" y="4013775"/>
+            <a:ext cx="4052713" cy="584775"/>
+          </a:xfrm>
+          <a:prstGeom prst="rect">
+            <a:avLst/>
+          </a:prstGeom>
+          <a:noFill/>
+        </p:spPr>
+        <p:txBody>
+          <a:bodyPr wrap="none" rtlCol="0">
+            <a:spAutoFit/>
+          </a:bodyPr>
+          <a:lstStyle/>
+          <a:p>
+            <a:r>
+              <a:rPr lang="en-US" altLang="ko-KR" sz="3200" b="1" dirty="0"/>
+              <a:t>Enhance the design</a:t>
+            </a:r>
+            <a:endParaRPr lang="ko-KR" altLang="en-US" sz="3200" b="1" dirty="0"/>
+          </a:p>
+        </p:txBody>
+      </p:sp>
+      <p:sp>
+        <p:nvSpPr>
+          <p:cNvPr id="11" name="TextBox 10">
+            <a:extLst>
+              <a:ext uri="{FF2B5EF4-FFF2-40B4-BE49-F238E27FC236}">
+                <a16:creationId xmlns:a16="http://schemas.microsoft.com/office/drawing/2014/main" id="{592BB97D-B076-C2CF-458A-3237C1B227A6}"/>
+              </a:ext>
+            </a:extLst>
+          </p:cNvPr>
+          <p:cNvSpPr txBox="1"/>
+          <p:nvPr/>
+        </p:nvSpPr>
+        <p:spPr>
+          <a:xfrm>
+            <a:off x="5057524" y="4597421"/>
+            <a:ext cx="4414803" cy="1938992"/>
+          </a:xfrm>
+          <a:prstGeom prst="rect">
+            <a:avLst/>
+          </a:prstGeom>
+          <a:noFill/>
+        </p:spPr>
+        <p:txBody>
+          <a:bodyPr wrap="square" rtlCol="0">
+            <a:spAutoFit/>
+          </a:bodyPr>
+          <a:lstStyle/>
+          <a:p>
+            <a:r>
+              <a:rPr lang="en-US" altLang="ko-KR" sz="2400" dirty="0"/>
+              <a:t>Change the overall design of the page by like adding images, make the head of each section div to satisfy users</a:t>
+            </a:r>
+            <a:r>
+              <a:rPr lang="en-US" altLang="ko-KR" sz="2400"/>
+              <a:t>’ aesthetic needs.</a:t>
+            </a:r>
+            <a:endParaRPr lang="ko-KR" altLang="en-US" sz="2400" dirty="0"/>
+          </a:p>
+        </p:txBody>
+      </p:sp>
+    </p:spTree>
+    <p:extLst>
+      <p:ext uri="{BB962C8B-B14F-4D97-AF65-F5344CB8AC3E}">
+        <p14:creationId xmlns:p14="http://schemas.microsoft.com/office/powerpoint/2010/main" val="1631555138"/>
+      </p:ext>
+    </p:extLst>
+  </p:cSld>
+  <p:clrMapOvr>
+    <a:masterClrMapping/>
+  </p:clrMapOvr>
+</p:sld>
+</file>
+
+<file path=ppt/slides/slide12.xml><?xml version="1.0" encoding="utf-8"?>
+<p:sld xmlns:a="http://schemas.openxmlformats.org/drawingml/2006/main" xmlns:r="http://schemas.openxmlformats.org/officeDocument/2006/relationships" xmlns:p="http://schemas.openxmlformats.org/presentationml/2006/main">
+  <p:cSld>
+    <p:spTree>
+      <p:nvGrpSpPr>
         <p:cNvPr id="1" name=""/>
         <p:cNvGrpSpPr/>
         <p:nvPr/>
@@ -6781,7 +7361,7 @@
           <a:p>
             <a:fld id="{84F9B66E-A506-4F32-84E5-F344782BD9BA}" type="slidenum">
               <a:rPr lang="ko-KR" altLang="en-US" smtClean="0"/>
-              <a:t>11</a:t>
+              <a:t>12</a:t>
             </a:fld>
             <a:endParaRPr lang="ko-KR" altLang="en-US" dirty="0"/>
           </a:p>

</xml_diff>

<commit_message>
Update comment in presentation, and place an empty space under the 'about' section, change name of the function which refresh the data
</commit_message>
<xml_diff>
--- a/Web_Application_Programming_FinalProject_Presentation_201821181_JisanKim.pptx
+++ b/Web_Application_Programming_FinalProject_Presentation_201821181_JisanKim.pptx
@@ -11,9 +11,9 @@
     <p:sldId id="258" r:id="rId2"/>
     <p:sldId id="368" r:id="rId3"/>
     <p:sldId id="415" r:id="rId4"/>
-    <p:sldId id="438" r:id="rId5"/>
-    <p:sldId id="439" r:id="rId6"/>
-    <p:sldId id="440" r:id="rId7"/>
+    <p:sldId id="440" r:id="rId5"/>
+    <p:sldId id="438" r:id="rId6"/>
+    <p:sldId id="439" r:id="rId7"/>
     <p:sldId id="413" r:id="rId8"/>
     <p:sldId id="441" r:id="rId9"/>
     <p:sldId id="442" r:id="rId10"/>
@@ -149,7 +149,7 @@
 <file path=ppt/revisionInfo.xml><?xml version="1.0" encoding="utf-8"?>
 <p1510:revInfo xmlns:a="http://schemas.openxmlformats.org/drawingml/2006/main" xmlns:r="http://schemas.openxmlformats.org/officeDocument/2006/relationships" xmlns:p1510="http://schemas.microsoft.com/office/powerpoint/2015/10/main">
   <p1510:revLst>
-    <p1510:client id="{81A18545-CA98-456E-A82F-B31D95D1B123}" v="9" dt="2024-11-14T08:26:25.856"/>
+    <p1510:client id="{81A18545-CA98-456E-A82F-B31D95D1B123}" v="12" dt="2024-11-18T00:50:28.388"/>
   </p1510:revLst>
 </p1510:revInfo>
 </file>
@@ -158,13 +158,13 @@
 <pc:chgInfo xmlns:a="http://schemas.openxmlformats.org/drawingml/2006/main" xmlns:r="http://schemas.openxmlformats.org/officeDocument/2006/relationships" xmlns:ac="http://schemas.microsoft.com/office/drawing/2013/main/command" xmlns:pc="http://schemas.microsoft.com/office/powerpoint/2013/main/command">
   <pc:docChgLst>
     <pc:chgData name="JISAN KIM" userId="afa2f7115fd23738" providerId="LiveId" clId="{81A18545-CA98-456E-A82F-B31D95D1B123}"/>
-    <pc:docChg chg="custSel addSld modSld">
-      <pc:chgData name="JISAN KIM" userId="afa2f7115fd23738" providerId="LiveId" clId="{81A18545-CA98-456E-A82F-B31D95D1B123}" dt="2024-11-14T08:28:59.524" v="537" actId="20577"/>
+    <pc:docChg chg="custSel addSld modSld sldOrd">
+      <pc:chgData name="JISAN KIM" userId="afa2f7115fd23738" providerId="LiveId" clId="{81A18545-CA98-456E-A82F-B31D95D1B123}" dt="2024-11-18T00:53:33.715" v="3368" actId="478"/>
       <pc:docMkLst>
         <pc:docMk/>
       </pc:docMkLst>
-      <pc:sldChg chg="addSp delSp modSp mod">
-        <pc:chgData name="JISAN KIM" userId="afa2f7115fd23738" providerId="LiveId" clId="{81A18545-CA98-456E-A82F-B31D95D1B123}" dt="2024-11-14T08:03:47.244" v="4" actId="1076"/>
+      <pc:sldChg chg="addSp delSp modSp mod modNotesTx">
+        <pc:chgData name="JISAN KIM" userId="afa2f7115fd23738" providerId="LiveId" clId="{81A18545-CA98-456E-A82F-B31D95D1B123}" dt="2024-11-17T23:47:27.980" v="689" actId="20577"/>
         <pc:sldMkLst>
           <pc:docMk/>
           <pc:sldMk cId="2064622165" sldId="258"/>
@@ -186,8 +186,85 @@
           </ac:picMkLst>
         </pc:picChg>
       </pc:sldChg>
-      <pc:sldChg chg="addSp delSp modSp mod">
-        <pc:chgData name="JISAN KIM" userId="afa2f7115fd23738" providerId="LiveId" clId="{81A18545-CA98-456E-A82F-B31D95D1B123}" dt="2024-11-14T08:04:05.391" v="9" actId="1076"/>
+      <pc:sldChg chg="modNotesTx">
+        <pc:chgData name="JISAN KIM" userId="afa2f7115fd23738" providerId="LiveId" clId="{81A18545-CA98-456E-A82F-B31D95D1B123}" dt="2024-11-18T00:07:21.049" v="3319" actId="20577"/>
+        <pc:sldMkLst>
+          <pc:docMk/>
+          <pc:sldMk cId="2661030401" sldId="368"/>
+        </pc:sldMkLst>
+      </pc:sldChg>
+      <pc:sldChg chg="modNotesTx">
+        <pc:chgData name="JISAN KIM" userId="afa2f7115fd23738" providerId="LiveId" clId="{81A18545-CA98-456E-A82F-B31D95D1B123}" dt="2024-11-17T23:56:17.246" v="1988" actId="20577"/>
+        <pc:sldMkLst>
+          <pc:docMk/>
+          <pc:sldMk cId="2574815497" sldId="413"/>
+        </pc:sldMkLst>
+      </pc:sldChg>
+      <pc:sldChg chg="addSp delSp modSp mod modNotesTx">
+        <pc:chgData name="JISAN KIM" userId="afa2f7115fd23738" providerId="LiveId" clId="{81A18545-CA98-456E-A82F-B31D95D1B123}" dt="2024-11-18T00:53:33.715" v="3368" actId="478"/>
+        <pc:sldMkLst>
+          <pc:docMk/>
+          <pc:sldMk cId="2874623575" sldId="414"/>
+        </pc:sldMkLst>
+        <pc:spChg chg="mod">
+          <ac:chgData name="JISAN KIM" userId="afa2f7115fd23738" providerId="LiveId" clId="{81A18545-CA98-456E-A82F-B31D95D1B123}" dt="2024-11-18T00:50:48.405" v="3367" actId="14100"/>
+          <ac:spMkLst>
+            <pc:docMk/>
+            <pc:sldMk cId="2874623575" sldId="414"/>
+            <ac:spMk id="9" creationId="{02AED5E3-6C34-4BEE-3750-B1C26CE4D8D0}"/>
+          </ac:spMkLst>
+        </pc:spChg>
+        <pc:spChg chg="add del mod">
+          <ac:chgData name="JISAN KIM" userId="afa2f7115fd23738" providerId="LiveId" clId="{81A18545-CA98-456E-A82F-B31D95D1B123}" dt="2024-11-18T00:53:33.715" v="3368" actId="478"/>
+          <ac:spMkLst>
+            <pc:docMk/>
+            <pc:sldMk cId="2874623575" sldId="414"/>
+            <ac:spMk id="10" creationId="{404E8739-DD6C-CB4B-3D33-A09F7CC7E9E1}"/>
+          </ac:spMkLst>
+        </pc:spChg>
+        <pc:picChg chg="add mod">
+          <ac:chgData name="JISAN KIM" userId="afa2f7115fd23738" providerId="LiveId" clId="{81A18545-CA98-456E-A82F-B31D95D1B123}" dt="2024-11-18T00:50:02.858" v="3357" actId="1076"/>
+          <ac:picMkLst>
+            <pc:docMk/>
+            <pc:sldMk cId="2874623575" sldId="414"/>
+            <ac:picMk id="5" creationId="{A7F07BA9-9FC6-61D5-7330-2ED4931E3A67}"/>
+          </ac:picMkLst>
+        </pc:picChg>
+        <pc:picChg chg="del mod modCrop">
+          <ac:chgData name="JISAN KIM" userId="afa2f7115fd23738" providerId="LiveId" clId="{81A18545-CA98-456E-A82F-B31D95D1B123}" dt="2024-11-18T00:50:04.887" v="3358" actId="478"/>
+          <ac:picMkLst>
+            <pc:docMk/>
+            <pc:sldMk cId="2874623575" sldId="414"/>
+            <ac:picMk id="7" creationId="{0539E591-7C90-6248-3A1D-CD2AA48EE853}"/>
+          </ac:picMkLst>
+        </pc:picChg>
+        <pc:picChg chg="add mod">
+          <ac:chgData name="JISAN KIM" userId="afa2f7115fd23738" providerId="LiveId" clId="{81A18545-CA98-456E-A82F-B31D95D1B123}" dt="2024-11-18T00:50:20.798" v="3360" actId="1076"/>
+          <ac:picMkLst>
+            <pc:docMk/>
+            <pc:sldMk cId="2874623575" sldId="414"/>
+            <ac:picMk id="8" creationId="{EBDEE35E-C35C-CEA4-0566-2376C186D55A}"/>
+          </ac:picMkLst>
+        </pc:picChg>
+        <pc:picChg chg="mod">
+          <ac:chgData name="JISAN KIM" userId="afa2f7115fd23738" providerId="LiveId" clId="{81A18545-CA98-456E-A82F-B31D95D1B123}" dt="2024-11-18T00:39:09.063" v="3348" actId="1076"/>
+          <ac:picMkLst>
+            <pc:docMk/>
+            <pc:sldMk cId="2874623575" sldId="414"/>
+            <ac:picMk id="16" creationId="{1AF1FB8A-1875-4AF8-400D-8AA106F5FB59}"/>
+          </ac:picMkLst>
+        </pc:picChg>
+        <pc:picChg chg="mod">
+          <ac:chgData name="JISAN KIM" userId="afa2f7115fd23738" providerId="LiveId" clId="{81A18545-CA98-456E-A82F-B31D95D1B123}" dt="2024-11-18T00:39:06.286" v="3347" actId="1076"/>
+          <ac:picMkLst>
+            <pc:docMk/>
+            <pc:sldMk cId="2874623575" sldId="414"/>
+            <ac:picMk id="18" creationId="{5B40B62A-A919-B7B4-9C01-F36B60BB19BF}"/>
+          </ac:picMkLst>
+        </pc:picChg>
+      </pc:sldChg>
+      <pc:sldChg chg="addSp delSp modSp mod modNotesTx">
+        <pc:chgData name="JISAN KIM" userId="afa2f7115fd23738" providerId="LiveId" clId="{81A18545-CA98-456E-A82F-B31D95D1B123}" dt="2024-11-18T00:08:57.629" v="3340" actId="20577"/>
         <pc:sldMkLst>
           <pc:docMk/>
           <pc:sldMk cId="4071252851" sldId="415"/>
@@ -209,8 +286,15 @@
           </ac:picMkLst>
         </pc:picChg>
       </pc:sldChg>
-      <pc:sldChg chg="addSp delSp modSp mod">
-        <pc:chgData name="JISAN KIM" userId="afa2f7115fd23738" providerId="LiveId" clId="{81A18545-CA98-456E-A82F-B31D95D1B123}" dt="2024-11-14T08:06:03.415" v="81" actId="1076"/>
+      <pc:sldChg chg="modNotesTx">
+        <pc:chgData name="JISAN KIM" userId="afa2f7115fd23738" providerId="LiveId" clId="{81A18545-CA98-456E-A82F-B31D95D1B123}" dt="2024-11-17T23:50:46.606" v="1377" actId="20577"/>
+        <pc:sldMkLst>
+          <pc:docMk/>
+          <pc:sldMk cId="1455050363" sldId="438"/>
+        </pc:sldMkLst>
+      </pc:sldChg>
+      <pc:sldChg chg="addSp delSp modSp mod modNotesTx">
+        <pc:chgData name="JISAN KIM" userId="afa2f7115fd23738" providerId="LiveId" clId="{81A18545-CA98-456E-A82F-B31D95D1B123}" dt="2024-11-17T23:53:48.145" v="1682" actId="20577"/>
         <pc:sldMkLst>
           <pc:docMk/>
           <pc:sldMk cId="1190513628" sldId="439"/>
@@ -264,8 +348,29 @@
           </ac:picMkLst>
         </pc:picChg>
       </pc:sldChg>
-      <pc:sldChg chg="addSp delSp modSp add mod">
-        <pc:chgData name="JISAN KIM" userId="afa2f7115fd23738" providerId="LiveId" clId="{81A18545-CA98-456E-A82F-B31D95D1B123}" dt="2024-11-14T08:28:59.524" v="537" actId="20577"/>
+      <pc:sldChg chg="ord modNotesTx">
+        <pc:chgData name="JISAN KIM" userId="afa2f7115fd23738" providerId="LiveId" clId="{81A18545-CA98-456E-A82F-B31D95D1B123}" dt="2024-11-18T00:09:45.219" v="3346" actId="20577"/>
+        <pc:sldMkLst>
+          <pc:docMk/>
+          <pc:sldMk cId="3165372148" sldId="440"/>
+        </pc:sldMkLst>
+      </pc:sldChg>
+      <pc:sldChg chg="modNotesTx">
+        <pc:chgData name="JISAN KIM" userId="afa2f7115fd23738" providerId="LiveId" clId="{81A18545-CA98-456E-A82F-B31D95D1B123}" dt="2024-11-17T23:58:43.209" v="2413" actId="20577"/>
+        <pc:sldMkLst>
+          <pc:docMk/>
+          <pc:sldMk cId="3837146194" sldId="441"/>
+        </pc:sldMkLst>
+      </pc:sldChg>
+      <pc:sldChg chg="modNotesTx">
+        <pc:chgData name="JISAN KIM" userId="afa2f7115fd23738" providerId="LiveId" clId="{81A18545-CA98-456E-A82F-B31D95D1B123}" dt="2024-11-18T00:02:02.112" v="2706" actId="20577"/>
+        <pc:sldMkLst>
+          <pc:docMk/>
+          <pc:sldMk cId="3657837329" sldId="442"/>
+        </pc:sldMkLst>
+      </pc:sldChg>
+      <pc:sldChg chg="addSp delSp modSp add mod modNotesTx">
+        <pc:chgData name="JISAN KIM" userId="afa2f7115fd23738" providerId="LiveId" clId="{81A18545-CA98-456E-A82F-B31D95D1B123}" dt="2024-11-18T00:06:47.310" v="3312" actId="20577"/>
         <pc:sldMkLst>
           <pc:docMk/>
           <pc:sldMk cId="1631555138" sldId="443"/>
@@ -1917,7 +2022,7 @@
           <a:p>
             <a:fld id="{4CFC31CF-C209-45DD-92E6-39C7CDE9F696}" type="datetimeFigureOut">
               <a:rPr lang="ko-KR" altLang="en-US" smtClean="0"/>
-              <a:t>2024-11-14</a:t>
+              <a:t>2024-11-18</a:t>
             </a:fld>
             <a:endParaRPr lang="ko-KR" altLang="en-US"/>
           </a:p>
@@ -2228,6 +2333,10 @@
           <a:bodyPr/>
           <a:lstStyle/>
           <a:p>
+            <a:r>
+              <a:rPr lang="en-US" altLang="ko-KR" dirty="0"/>
+              <a:t>Hello, My name is Jisan Kim. I’ll introduce my final project, Air Quality Monitoring Dashboard in Busan.</a:t>
+            </a:r>
             <a:endParaRPr lang="ko-KR" altLang="en-US" dirty="0"/>
           </a:p>
         </p:txBody>
@@ -2314,68 +2423,15 @@
           <a:p>
             <a:pPr algn="l"/>
             <a:r>
-              <a:rPr lang="en-US" altLang="ko-KR" sz="2800" b="0" i="0">
+              <a:rPr lang="en-US" altLang="ko-KR" sz="2800" b="0" i="0" dirty="0">
                 <a:solidFill>
                   <a:srgbClr val="D1D5DB"/>
                 </a:solidFill>
                 <a:effectLst/>
                 <a:latin typeface="Söhne"/>
               </a:rPr>
-              <a:t>The manufacturing process is also a problem for many of these methods.</a:t>
-            </a:r>
-          </a:p>
-          <a:p>
-            <a:pPr algn="l"/>
-            <a:endParaRPr lang="en-US" altLang="ko-KR" sz="2800" b="0" i="0">
-              <a:solidFill>
-                <a:srgbClr val="D1D5DB"/>
-              </a:solidFill>
-              <a:effectLst/>
-              <a:latin typeface="Söhne"/>
-            </a:endParaRPr>
-          </a:p>
-          <a:p>
-            <a:pPr algn="l"/>
-            <a:r>
-              <a:rPr lang="en-US" altLang="ko-KR" sz="2800" b="0" i="0">
-                <a:solidFill>
-                  <a:srgbClr val="D1D5DB"/>
-                </a:solidFill>
-                <a:effectLst/>
-                <a:latin typeface="Söhne"/>
-              </a:rPr>
-              <a:t>They are not designed to be easily made, and sometimes they need special materials that are hard to get in large amounts.</a:t>
-            </a:r>
-          </a:p>
-          <a:p>
-            <a:pPr algn="l"/>
-            <a:endParaRPr lang="en-US" altLang="ko-KR" sz="2800" b="0" i="0">
-              <a:solidFill>
-                <a:srgbClr val="D1D5DB"/>
-              </a:solidFill>
-              <a:effectLst/>
-              <a:latin typeface="Söhne"/>
-            </a:endParaRPr>
-          </a:p>
-          <a:p>
-            <a:pPr algn="l"/>
-            <a:r>
-              <a:rPr lang="en-US" altLang="ko-KR" sz="2800" b="0" i="0">
-                <a:solidFill>
-                  <a:srgbClr val="D1D5DB"/>
-                </a:solidFill>
-                <a:effectLst/>
-                <a:latin typeface="Söhne"/>
-              </a:rPr>
-              <a:t>All these things together mean that these methods can not be made in big numbers at a reasonable cost, making them not so practical for widespread use.</a:t>
-            </a:r>
-            <a:endParaRPr lang="en-US" altLang="ko-KR" sz="2800" b="0" i="0" dirty="0">
-              <a:solidFill>
-                <a:srgbClr val="D1D5DB"/>
-              </a:solidFill>
-              <a:effectLst/>
-              <a:latin typeface="Söhne"/>
-            </a:endParaRPr>
+              <a:t>These methods are for the real-time data update. 30 minutes of the interval has been set.</a:t>
+            </a:r>
           </a:p>
         </p:txBody>
       </p:sp>
@@ -2479,68 +2535,35 @@
           <a:p>
             <a:pPr algn="l"/>
             <a:r>
-              <a:rPr lang="en-US" altLang="ko-KR" sz="2800" b="0" i="0">
+              <a:rPr lang="en-US" altLang="ko-KR" sz="2800" b="0" i="0" dirty="0">
                 <a:solidFill>
                   <a:srgbClr val="D1D5DB"/>
                 </a:solidFill>
                 <a:effectLst/>
                 <a:latin typeface="Söhne"/>
               </a:rPr>
-              <a:t>The manufacturing process is also a problem for many of these methods.</a:t>
-            </a:r>
-          </a:p>
-          <a:p>
-            <a:pPr algn="l"/>
-            <a:endParaRPr lang="en-US" altLang="ko-KR" sz="2800" b="0" i="0">
-              <a:solidFill>
-                <a:srgbClr val="D1D5DB"/>
-              </a:solidFill>
-              <a:effectLst/>
-              <a:latin typeface="Söhne"/>
-            </a:endParaRPr>
-          </a:p>
-          <a:p>
-            <a:pPr algn="l"/>
-            <a:r>
-              <a:rPr lang="en-US" altLang="ko-KR" sz="2800" b="0" i="0">
+              <a:t>From now on, I’m </a:t>
+            </a:r>
+            <a:r>
+              <a:rPr lang="en-US" altLang="ko-KR" sz="2800" b="0" i="0" dirty="0" err="1">
                 <a:solidFill>
                   <a:srgbClr val="D1D5DB"/>
                 </a:solidFill>
                 <a:effectLst/>
                 <a:latin typeface="Söhne"/>
               </a:rPr>
-              <a:t>They are not designed to be easily made, and sometimes they need special materials that are hard to get in large amounts.</a:t>
-            </a:r>
-          </a:p>
-          <a:p>
-            <a:pPr algn="l"/>
-            <a:endParaRPr lang="en-US" altLang="ko-KR" sz="2800" b="0" i="0">
-              <a:solidFill>
-                <a:srgbClr val="D1D5DB"/>
-              </a:solidFill>
-              <a:effectLst/>
-              <a:latin typeface="Söhne"/>
-            </a:endParaRPr>
-          </a:p>
-          <a:p>
-            <a:pPr algn="l"/>
-            <a:r>
-              <a:rPr lang="en-US" altLang="ko-KR" sz="2800" b="0" i="0">
+              <a:t>gonna</a:t>
+            </a:r>
+            <a:r>
+              <a:rPr lang="en-US" altLang="ko-KR" sz="2800" b="0" i="0" dirty="0">
                 <a:solidFill>
                   <a:srgbClr val="D1D5DB"/>
                 </a:solidFill>
                 <a:effectLst/>
                 <a:latin typeface="Söhne"/>
               </a:rPr>
-              <a:t>All these things together mean that these methods can not be made in big numbers at a reasonable cost, making them not so practical for widespread use.</a:t>
-            </a:r>
-            <a:endParaRPr lang="en-US" altLang="ko-KR" sz="2800" b="0" i="0" dirty="0">
-              <a:solidFill>
-                <a:srgbClr val="D1D5DB"/>
-              </a:solidFill>
-              <a:effectLst/>
-              <a:latin typeface="Söhne"/>
-            </a:endParaRPr>
+              <a:t> focus on applying some minor features. For example, I’m planning to add weather forecast, specifically showing temperature &amp; humidity of next 7 days, and utilize some images to enhance the design of the page.</a:t>
+            </a:r>
           </a:p>
         </p:txBody>
       </p:sp>
@@ -2745,13 +2768,16 @@
           <a:bodyPr/>
           <a:lstStyle/>
           <a:p>
-            <a:endParaRPr lang="en-US" altLang="ko-KR" sz="5400" b="0" i="0" dirty="0">
-              <a:solidFill>
-                <a:srgbClr val="D1D5DB"/>
-              </a:solidFill>
-              <a:effectLst/>
-              <a:latin typeface="Söhne"/>
-            </a:endParaRPr>
+            <a:r>
+              <a:rPr lang="en-US" altLang="ko-KR" sz="5400" b="0" i="0" dirty="0">
+                <a:solidFill>
+                  <a:srgbClr val="D1D5DB"/>
+                </a:solidFill>
+                <a:effectLst/>
+                <a:latin typeface="Söhne"/>
+              </a:rPr>
+              <a:t>There are several requirements for our final project. For the presentation, I’ll mention the status of my project depending on these four top requirements.</a:t>
+            </a:r>
           </a:p>
         </p:txBody>
       </p:sp>
@@ -2843,6 +2869,15 @@
                 <a:spcPts val="800"/>
               </a:spcAft>
             </a:pPr>
+            <a:r>
+              <a:rPr lang="en-US" altLang="ko-KR" sz="1800" kern="100" dirty="0">
+                <a:effectLst/>
+                <a:latin typeface="맑은 고딕" panose="020B0503020000020004" pitchFamily="50" charset="-127"/>
+                <a:ea typeface="맑은 고딕" panose="020B0503020000020004" pitchFamily="50" charset="-127"/>
+                <a:cs typeface="Times New Roman" panose="02020603050405020304" pitchFamily="18" charset="0"/>
+              </a:rPr>
+              <a:t>First of all, as the user interface design, the first screen includes dashboard, header, footer and navigation bar like this.</a:t>
+            </a:r>
             <a:endParaRPr lang="ko-KR" altLang="ko-KR" sz="1800" kern="100" dirty="0">
               <a:effectLst/>
               <a:latin typeface="맑은 고딕" panose="020B0503020000020004" pitchFamily="50" charset="-127"/>
@@ -2889,6 +2924,136 @@
 </file>
 
 <file path=ppt/notesSlides/notesSlide4.xml><?xml version="1.0" encoding="utf-8"?>
+<p:notes xmlns:a="http://schemas.openxmlformats.org/drawingml/2006/main" xmlns:r="http://schemas.openxmlformats.org/officeDocument/2006/relationships" xmlns:p="http://schemas.openxmlformats.org/presentationml/2006/main">
+  <p:cSld>
+    <p:spTree>
+      <p:nvGrpSpPr>
+        <p:cNvPr id="1" name="">
+          <a:extLst>
+            <a:ext uri="{FF2B5EF4-FFF2-40B4-BE49-F238E27FC236}">
+              <a16:creationId xmlns:a16="http://schemas.microsoft.com/office/drawing/2014/main" id="{4202AC39-455D-CB14-3DC0-06C0BB91BD21}"/>
+            </a:ext>
+          </a:extLst>
+        </p:cNvPr>
+        <p:cNvGrpSpPr/>
+        <p:nvPr/>
+      </p:nvGrpSpPr>
+      <p:grpSpPr>
+        <a:xfrm>
+          <a:off x="0" y="0"/>
+          <a:ext cx="0" cy="0"/>
+          <a:chOff x="0" y="0"/>
+          <a:chExt cx="0" cy="0"/>
+        </a:xfrm>
+      </p:grpSpPr>
+      <p:sp>
+        <p:nvSpPr>
+          <p:cNvPr id="2" name="슬라이드 이미지 개체 틀 1">
+            <a:extLst>
+              <a:ext uri="{FF2B5EF4-FFF2-40B4-BE49-F238E27FC236}">
+                <a16:creationId xmlns:a16="http://schemas.microsoft.com/office/drawing/2014/main" id="{0D93F1F0-B548-8A17-AF41-EF24BB039F5D}"/>
+              </a:ext>
+            </a:extLst>
+          </p:cNvPr>
+          <p:cNvSpPr>
+            <a:spLocks noGrp="1" noRot="1" noChangeAspect="1"/>
+          </p:cNvSpPr>
+          <p:nvPr>
+            <p:ph type="sldImg"/>
+          </p:nvPr>
+        </p:nvSpPr>
+        <p:spPr/>
+      </p:sp>
+      <p:sp>
+        <p:nvSpPr>
+          <p:cNvPr id="3" name="슬라이드 노트 개체 틀 2">
+            <a:extLst>
+              <a:ext uri="{FF2B5EF4-FFF2-40B4-BE49-F238E27FC236}">
+                <a16:creationId xmlns:a16="http://schemas.microsoft.com/office/drawing/2014/main" id="{F27CD6DA-CAA1-1873-F6B8-0859575306AC}"/>
+              </a:ext>
+            </a:extLst>
+          </p:cNvPr>
+          <p:cNvSpPr>
+            <a:spLocks noGrp="1"/>
+          </p:cNvSpPr>
+          <p:nvPr>
+            <p:ph type="body" idx="1"/>
+          </p:nvPr>
+        </p:nvSpPr>
+        <p:spPr/>
+        <p:txBody>
+          <a:bodyPr/>
+          <a:lstStyle/>
+          <a:p>
+            <a:pPr algn="l" latinLnBrk="1">
+              <a:lnSpc>
+                <a:spcPct val="107000"/>
+              </a:lnSpc>
+              <a:spcAft>
+                <a:spcPts val="800"/>
+              </a:spcAft>
+            </a:pPr>
+            <a:r>
+              <a:rPr lang="en-US" altLang="ko-KR" sz="1800" kern="100" dirty="0">
+                <a:effectLst/>
+                <a:latin typeface="맑은 고딕" panose="020B0503020000020004" pitchFamily="50" charset="-127"/>
+                <a:ea typeface="맑은 고딕" panose="020B0503020000020004" pitchFamily="50" charset="-127"/>
+                <a:cs typeface="Times New Roman" panose="02020603050405020304" pitchFamily="18" charset="0"/>
+              </a:rPr>
+              <a:t>The main dashboard shows the numerical amount of each pollutant. The values had been taken by Open Weather API.</a:t>
+            </a:r>
+            <a:endParaRPr lang="ko-KR" altLang="ko-KR" sz="1800" kern="100" dirty="0">
+              <a:effectLst/>
+              <a:latin typeface="맑은 고딕" panose="020B0503020000020004" pitchFamily="50" charset="-127"/>
+              <a:ea typeface="맑은 고딕" panose="020B0503020000020004" pitchFamily="50" charset="-127"/>
+              <a:cs typeface="Times New Roman" panose="02020603050405020304" pitchFamily="18" charset="0"/>
+            </a:endParaRPr>
+          </a:p>
+        </p:txBody>
+      </p:sp>
+      <p:sp>
+        <p:nvSpPr>
+          <p:cNvPr id="4" name="슬라이드 번호 개체 틀 3">
+            <a:extLst>
+              <a:ext uri="{FF2B5EF4-FFF2-40B4-BE49-F238E27FC236}">
+                <a16:creationId xmlns:a16="http://schemas.microsoft.com/office/drawing/2014/main" id="{1940472F-11A3-CA5D-494C-680110095C2D}"/>
+              </a:ext>
+            </a:extLst>
+          </p:cNvPr>
+          <p:cNvSpPr>
+            <a:spLocks noGrp="1"/>
+          </p:cNvSpPr>
+          <p:nvPr>
+            <p:ph type="sldNum" sz="quarter" idx="5"/>
+          </p:nvPr>
+        </p:nvSpPr>
+        <p:spPr/>
+        <p:txBody>
+          <a:bodyPr/>
+          <a:lstStyle/>
+          <a:p>
+            <a:fld id="{CEDF3CE0-CFE8-42C0-962F-966571F77612}" type="slidenum">
+              <a:rPr lang="ko-KR" altLang="en-US" smtClean="0"/>
+              <a:t>4</a:t>
+            </a:fld>
+            <a:endParaRPr lang="ko-KR" altLang="en-US"/>
+          </a:p>
+        </p:txBody>
+      </p:sp>
+    </p:spTree>
+    <p:extLst>
+      <p:ext uri="{BB962C8B-B14F-4D97-AF65-F5344CB8AC3E}">
+        <p14:creationId xmlns:p14="http://schemas.microsoft.com/office/powerpoint/2010/main" val="3056327555"/>
+      </p:ext>
+    </p:extLst>
+  </p:cSld>
+  <p:clrMapOvr>
+    <a:masterClrMapping/>
+  </p:clrMapOvr>
+</p:notes>
+</file>
+
+<file path=ppt/notesSlides/notesSlide5.xml><?xml version="1.0" encoding="utf-8"?>
 <p:notes xmlns:a="http://schemas.openxmlformats.org/drawingml/2006/main" xmlns:r="http://schemas.openxmlformats.org/officeDocument/2006/relationships" xmlns:p="http://schemas.openxmlformats.org/presentationml/2006/main">
   <p:cSld>
     <p:spTree>
@@ -2958,6 +3123,15 @@
                 <a:spcPts val="800"/>
               </a:spcAft>
             </a:pPr>
+            <a:r>
+              <a:rPr lang="en-US" altLang="ko-KR" sz="1800" kern="100" dirty="0">
+                <a:effectLst/>
+                <a:latin typeface="맑은 고딕" panose="020B0503020000020004" pitchFamily="50" charset="-127"/>
+                <a:ea typeface="맑은 고딕" panose="020B0503020000020004" pitchFamily="50" charset="-127"/>
+                <a:cs typeface="Times New Roman" panose="02020603050405020304" pitchFamily="18" charset="0"/>
+              </a:rPr>
+              <a:t>There is a special point with the header and footer. Depending on the air quality, specifically the concentration of PM2.5, the header and footer change their color from blue to red.</a:t>
+            </a:r>
             <a:endParaRPr lang="ko-KR" altLang="ko-KR" sz="1800" kern="100" dirty="0">
               <a:effectLst/>
               <a:latin typeface="맑은 고딕" panose="020B0503020000020004" pitchFamily="50" charset="-127"/>
@@ -2990,7 +3164,7 @@
           <a:p>
             <a:fld id="{CEDF3CE0-CFE8-42C0-962F-966571F77612}" type="slidenum">
               <a:rPr lang="ko-KR" altLang="en-US" smtClean="0"/>
-              <a:t>4</a:t>
+              <a:t>5</a:t>
             </a:fld>
             <a:endParaRPr lang="ko-KR" altLang="en-US"/>
           </a:p>
@@ -3009,7 +3183,7 @@
 </p:notes>
 </file>
 
-<file path=ppt/notesSlides/notesSlide5.xml><?xml version="1.0" encoding="utf-8"?>
+<file path=ppt/notesSlides/notesSlide6.xml><?xml version="1.0" encoding="utf-8"?>
 <p:notes xmlns:a="http://schemas.openxmlformats.org/drawingml/2006/main" xmlns:r="http://schemas.openxmlformats.org/officeDocument/2006/relationships" xmlns:p="http://schemas.openxmlformats.org/presentationml/2006/main">
   <p:cSld>
     <p:spTree>
@@ -3079,6 +3253,15 @@
                 <a:spcPts val="800"/>
               </a:spcAft>
             </a:pPr>
+            <a:r>
+              <a:rPr lang="en-US" altLang="ko-KR" sz="1800" kern="100" dirty="0">
+                <a:effectLst/>
+                <a:latin typeface="맑은 고딕" panose="020B0503020000020004" pitchFamily="50" charset="-127"/>
+                <a:ea typeface="맑은 고딕" panose="020B0503020000020004" pitchFamily="50" charset="-127"/>
+                <a:cs typeface="Times New Roman" panose="02020603050405020304" pitchFamily="18" charset="0"/>
+              </a:rPr>
+              <a:t>Next, the page is separated in three sections. If a user click the navigation bar, it takes the user to the dedicated section.</a:t>
+            </a:r>
             <a:endParaRPr lang="ko-KR" altLang="ko-KR" sz="1800" kern="100" dirty="0">
               <a:effectLst/>
               <a:latin typeface="맑은 고딕" panose="020B0503020000020004" pitchFamily="50" charset="-127"/>
@@ -3111,7 +3294,7 @@
           <a:p>
             <a:fld id="{CEDF3CE0-CFE8-42C0-962F-966571F77612}" type="slidenum">
               <a:rPr lang="ko-KR" altLang="en-US" smtClean="0"/>
-              <a:t>5</a:t>
+              <a:t>6</a:t>
             </a:fld>
             <a:endParaRPr lang="ko-KR" altLang="en-US"/>
           </a:p>
@@ -3121,127 +3304,6 @@
     <p:extLst>
       <p:ext uri="{BB962C8B-B14F-4D97-AF65-F5344CB8AC3E}">
         <p14:creationId xmlns:p14="http://schemas.microsoft.com/office/powerpoint/2010/main" val="2220167511"/>
-      </p:ext>
-    </p:extLst>
-  </p:cSld>
-  <p:clrMapOvr>
-    <a:masterClrMapping/>
-  </p:clrMapOvr>
-</p:notes>
-</file>
-
-<file path=ppt/notesSlides/notesSlide6.xml><?xml version="1.0" encoding="utf-8"?>
-<p:notes xmlns:a="http://schemas.openxmlformats.org/drawingml/2006/main" xmlns:r="http://schemas.openxmlformats.org/officeDocument/2006/relationships" xmlns:p="http://schemas.openxmlformats.org/presentationml/2006/main">
-  <p:cSld>
-    <p:spTree>
-      <p:nvGrpSpPr>
-        <p:cNvPr id="1" name="">
-          <a:extLst>
-            <a:ext uri="{FF2B5EF4-FFF2-40B4-BE49-F238E27FC236}">
-              <a16:creationId xmlns:a16="http://schemas.microsoft.com/office/drawing/2014/main" id="{4202AC39-455D-CB14-3DC0-06C0BB91BD21}"/>
-            </a:ext>
-          </a:extLst>
-        </p:cNvPr>
-        <p:cNvGrpSpPr/>
-        <p:nvPr/>
-      </p:nvGrpSpPr>
-      <p:grpSpPr>
-        <a:xfrm>
-          <a:off x="0" y="0"/>
-          <a:ext cx="0" cy="0"/>
-          <a:chOff x="0" y="0"/>
-          <a:chExt cx="0" cy="0"/>
-        </a:xfrm>
-      </p:grpSpPr>
-      <p:sp>
-        <p:nvSpPr>
-          <p:cNvPr id="2" name="슬라이드 이미지 개체 틀 1">
-            <a:extLst>
-              <a:ext uri="{FF2B5EF4-FFF2-40B4-BE49-F238E27FC236}">
-                <a16:creationId xmlns:a16="http://schemas.microsoft.com/office/drawing/2014/main" id="{0D93F1F0-B548-8A17-AF41-EF24BB039F5D}"/>
-              </a:ext>
-            </a:extLst>
-          </p:cNvPr>
-          <p:cNvSpPr>
-            <a:spLocks noGrp="1" noRot="1" noChangeAspect="1"/>
-          </p:cNvSpPr>
-          <p:nvPr>
-            <p:ph type="sldImg"/>
-          </p:nvPr>
-        </p:nvSpPr>
-        <p:spPr/>
-      </p:sp>
-      <p:sp>
-        <p:nvSpPr>
-          <p:cNvPr id="3" name="슬라이드 노트 개체 틀 2">
-            <a:extLst>
-              <a:ext uri="{FF2B5EF4-FFF2-40B4-BE49-F238E27FC236}">
-                <a16:creationId xmlns:a16="http://schemas.microsoft.com/office/drawing/2014/main" id="{F27CD6DA-CAA1-1873-F6B8-0859575306AC}"/>
-              </a:ext>
-            </a:extLst>
-          </p:cNvPr>
-          <p:cNvSpPr>
-            <a:spLocks noGrp="1"/>
-          </p:cNvSpPr>
-          <p:nvPr>
-            <p:ph type="body" idx="1"/>
-          </p:nvPr>
-        </p:nvSpPr>
-        <p:spPr/>
-        <p:txBody>
-          <a:bodyPr/>
-          <a:lstStyle/>
-          <a:p>
-            <a:pPr algn="l" latinLnBrk="1">
-              <a:lnSpc>
-                <a:spcPct val="107000"/>
-              </a:lnSpc>
-              <a:spcAft>
-                <a:spcPts val="800"/>
-              </a:spcAft>
-            </a:pPr>
-            <a:endParaRPr lang="ko-KR" altLang="ko-KR" sz="1800" kern="100" dirty="0">
-              <a:effectLst/>
-              <a:latin typeface="맑은 고딕" panose="020B0503020000020004" pitchFamily="50" charset="-127"/>
-              <a:ea typeface="맑은 고딕" panose="020B0503020000020004" pitchFamily="50" charset="-127"/>
-              <a:cs typeface="Times New Roman" panose="02020603050405020304" pitchFamily="18" charset="0"/>
-            </a:endParaRPr>
-          </a:p>
-        </p:txBody>
-      </p:sp>
-      <p:sp>
-        <p:nvSpPr>
-          <p:cNvPr id="4" name="슬라이드 번호 개체 틀 3">
-            <a:extLst>
-              <a:ext uri="{FF2B5EF4-FFF2-40B4-BE49-F238E27FC236}">
-                <a16:creationId xmlns:a16="http://schemas.microsoft.com/office/drawing/2014/main" id="{1940472F-11A3-CA5D-494C-680110095C2D}"/>
-              </a:ext>
-            </a:extLst>
-          </p:cNvPr>
-          <p:cNvSpPr>
-            <a:spLocks noGrp="1"/>
-          </p:cNvSpPr>
-          <p:nvPr>
-            <p:ph type="sldNum" sz="quarter" idx="5"/>
-          </p:nvPr>
-        </p:nvSpPr>
-        <p:spPr/>
-        <p:txBody>
-          <a:bodyPr/>
-          <a:lstStyle/>
-          <a:p>
-            <a:fld id="{CEDF3CE0-CFE8-42C0-962F-966571F77612}" type="slidenum">
-              <a:rPr lang="ko-KR" altLang="en-US" smtClean="0"/>
-              <a:t>6</a:t>
-            </a:fld>
-            <a:endParaRPr lang="ko-KR" altLang="en-US"/>
-          </a:p>
-        </p:txBody>
-      </p:sp>
-    </p:spTree>
-    <p:extLst>
-      <p:ext uri="{BB962C8B-B14F-4D97-AF65-F5344CB8AC3E}">
-        <p14:creationId xmlns:p14="http://schemas.microsoft.com/office/powerpoint/2010/main" val="3056327555"/>
       </p:ext>
     </p:extLst>
   </p:cSld>
@@ -3296,13 +3358,16 @@
           <a:lstStyle/>
           <a:p>
             <a:pPr algn="l"/>
-            <a:endParaRPr lang="en-US" altLang="ko-KR" sz="4000" b="0" i="0" dirty="0">
-              <a:solidFill>
-                <a:srgbClr val="D1D5DB"/>
-              </a:solidFill>
-              <a:effectLst/>
-              <a:latin typeface="Söhne"/>
-            </a:endParaRPr>
+            <a:r>
+              <a:rPr lang="en-US" altLang="ko-KR" sz="4000" b="0" i="0" dirty="0">
+                <a:solidFill>
+                  <a:srgbClr val="D1D5DB"/>
+                </a:solidFill>
+                <a:effectLst/>
+                <a:latin typeface="Söhne"/>
+              </a:rPr>
+              <a:t>For data display &amp; visual representation, Chart.js has been used. I’ll explain one by one.</a:t>
+            </a:r>
           </a:p>
         </p:txBody>
       </p:sp>
@@ -3405,13 +3470,16 @@
           <a:lstStyle/>
           <a:p>
             <a:pPr algn="l"/>
-            <a:endParaRPr lang="en-US" altLang="ko-KR" sz="4000" b="0" i="0" dirty="0">
-              <a:solidFill>
-                <a:srgbClr val="D1D5DB"/>
-              </a:solidFill>
-              <a:effectLst/>
-              <a:latin typeface="Söhne"/>
-            </a:endParaRPr>
+            <a:r>
+              <a:rPr lang="en-US" altLang="ko-KR" sz="4000" b="0" i="0" dirty="0">
+                <a:solidFill>
+                  <a:srgbClr val="D1D5DB"/>
+                </a:solidFill>
+                <a:effectLst/>
+                <a:latin typeface="Söhne"/>
+              </a:rPr>
+              <a:t>Line chart shows the temperature and humidity trends over the past 7 days. However, there was an issue that getting previous data was a paid feature. So, I implemented a function that generates seven random function by adding -2 to 2 to today’s data.</a:t>
+            </a:r>
           </a:p>
         </p:txBody>
       </p:sp>
@@ -3520,13 +3588,16 @@
           <a:lstStyle/>
           <a:p>
             <a:pPr algn="l"/>
-            <a:endParaRPr lang="en-US" altLang="ko-KR" sz="4000" b="0" i="0" dirty="0">
-              <a:solidFill>
-                <a:srgbClr val="D1D5DB"/>
-              </a:solidFill>
-              <a:effectLst/>
-              <a:latin typeface="Söhne"/>
-            </a:endParaRPr>
+            <a:r>
+              <a:rPr lang="en-US" altLang="ko-KR" sz="4000" b="0" i="0" dirty="0">
+                <a:solidFill>
+                  <a:srgbClr val="D1D5DB"/>
+                </a:solidFill>
+                <a:effectLst/>
+                <a:latin typeface="Söhne"/>
+              </a:rPr>
+              <a:t>Next one is bar &amp; doughnut chart. The bar chart shows the pollutant level, and the doughnut char shows the distribution of each pollutant. All the charts update their data periodically.</a:t>
+            </a:r>
           </a:p>
         </p:txBody>
       </p:sp>
@@ -3703,7 +3774,7 @@
           <a:p>
             <a:fld id="{22895D34-D68D-42F6-BAE0-20973CEBBAD2}" type="datetime1">
               <a:rPr lang="ko-KR" altLang="en-US" smtClean="0"/>
-              <a:t>2024-11-14</a:t>
+              <a:t>2024-11-18</a:t>
             </a:fld>
             <a:endParaRPr lang="ko-KR" altLang="en-US"/>
           </a:p>
@@ -3873,7 +3944,7 @@
           <a:p>
             <a:fld id="{EE90CF76-970C-4D51-83E0-DAD5C1736A83}" type="datetime1">
               <a:rPr lang="ko-KR" altLang="en-US" smtClean="0"/>
-              <a:t>2024-11-14</a:t>
+              <a:t>2024-11-18</a:t>
             </a:fld>
             <a:endParaRPr lang="ko-KR" altLang="en-US"/>
           </a:p>
@@ -4058,7 +4129,7 @@
           <a:p>
             <a:fld id="{9900650B-889C-4160-B707-48654F261357}" type="datetime1">
               <a:rPr lang="ko-KR" altLang="en-US" smtClean="0"/>
-              <a:t>2024-11-14</a:t>
+              <a:t>2024-11-18</a:t>
             </a:fld>
             <a:endParaRPr lang="ko-KR" altLang="en-US"/>
           </a:p>
@@ -4233,7 +4304,7 @@
           <a:p>
             <a:fld id="{84DE8C09-54C4-4FE6-A403-72190ACC5E43}" type="datetime1">
               <a:rPr lang="ko-KR" altLang="en-US" smtClean="0"/>
-              <a:t>2024-11-14</a:t>
+              <a:t>2024-11-18</a:t>
             </a:fld>
             <a:endParaRPr lang="ko-KR" altLang="en-US"/>
           </a:p>
@@ -4477,7 +4548,7 @@
           <a:p>
             <a:fld id="{AFC09797-F8D0-4F09-84FB-BAFD991391C6}" type="datetime1">
               <a:rPr lang="ko-KR" altLang="en-US" smtClean="0"/>
-              <a:t>2024-11-14</a:t>
+              <a:t>2024-11-18</a:t>
             </a:fld>
             <a:endParaRPr lang="ko-KR" altLang="en-US"/>
           </a:p>
@@ -4709,7 +4780,7 @@
           <a:p>
             <a:fld id="{EE5A8268-1C5C-447A-9087-90EA2F609126}" type="datetime1">
               <a:rPr lang="ko-KR" altLang="en-US" smtClean="0"/>
-              <a:t>2024-11-14</a:t>
+              <a:t>2024-11-18</a:t>
             </a:fld>
             <a:endParaRPr lang="ko-KR" altLang="en-US"/>
           </a:p>
@@ -5076,7 +5147,7 @@
           <a:p>
             <a:fld id="{8F161699-7DEC-4748-B84B-26D338138F12}" type="datetime1">
               <a:rPr lang="ko-KR" altLang="en-US" smtClean="0"/>
-              <a:t>2024-11-14</a:t>
+              <a:t>2024-11-18</a:t>
             </a:fld>
             <a:endParaRPr lang="ko-KR" altLang="en-US"/>
           </a:p>
@@ -5194,7 +5265,7 @@
           <a:p>
             <a:fld id="{FB506333-EEF8-440D-A86D-CDD2F0AF3078}" type="datetime1">
               <a:rPr lang="ko-KR" altLang="en-US" smtClean="0"/>
-              <a:t>2024-11-14</a:t>
+              <a:t>2024-11-18</a:t>
             </a:fld>
             <a:endParaRPr lang="ko-KR" altLang="en-US"/>
           </a:p>
@@ -5294,7 +5365,7 @@
           <a:p>
             <a:fld id="{3161CA01-32BA-43E2-9ABF-84F8B0644982}" type="datetime1">
               <a:rPr lang="ko-KR" altLang="en-US" smtClean="0"/>
-              <a:t>2024-11-14</a:t>
+              <a:t>2024-11-18</a:t>
             </a:fld>
             <a:endParaRPr lang="ko-KR" altLang="en-US"/>
           </a:p>
@@ -5576,7 +5647,7 @@
           <a:p>
             <a:fld id="{B49C4273-4D6B-4952-BFCC-453F05286477}" type="datetime1">
               <a:rPr lang="ko-KR" altLang="en-US" smtClean="0"/>
-              <a:t>2024-11-14</a:t>
+              <a:t>2024-11-18</a:t>
             </a:fld>
             <a:endParaRPr lang="ko-KR" altLang="en-US"/>
           </a:p>
@@ -5838,7 +5909,7 @@
           <a:p>
             <a:fld id="{F24DDE7D-9861-431D-B238-8C895D4A33C3}" type="datetime1">
               <a:rPr lang="ko-KR" altLang="en-US" smtClean="0"/>
-              <a:t>2024-11-14</a:t>
+              <a:t>2024-11-18</a:t>
             </a:fld>
             <a:endParaRPr lang="ko-KR" altLang="en-US"/>
           </a:p>
@@ -6056,7 +6127,7 @@
           <a:p>
             <a:fld id="{62B391FA-8B52-439F-8964-2547BDD1DDBC}" type="datetime1">
               <a:rPr lang="ko-KR" altLang="en-US" smtClean="0"/>
-              <a:t>2024-11-14</a:t>
+              <a:t>2024-11-18</a:t>
             </a:fld>
             <a:endParaRPr lang="ko-KR" altLang="en-US"/>
           </a:p>
@@ -6869,12 +6940,48 @@
           </a:p>
         </p:txBody>
       </p:sp>
+      <p:sp>
+        <p:nvSpPr>
+          <p:cNvPr id="9" name="TextBox 8">
+            <a:extLst>
+              <a:ext uri="{FF2B5EF4-FFF2-40B4-BE49-F238E27FC236}">
+                <a16:creationId xmlns:a16="http://schemas.microsoft.com/office/drawing/2014/main" id="{02AED5E3-6C34-4BEE-3750-B1C26CE4D8D0}"/>
+              </a:ext>
+            </a:extLst>
+          </p:cNvPr>
+          <p:cNvSpPr txBox="1"/>
+          <p:nvPr/>
+        </p:nvSpPr>
+        <p:spPr>
+          <a:xfrm>
+            <a:off x="6926581" y="1691565"/>
+            <a:ext cx="2668436" cy="830997"/>
+          </a:xfrm>
+          <a:prstGeom prst="rect">
+            <a:avLst/>
+          </a:prstGeom>
+          <a:noFill/>
+        </p:spPr>
+        <p:txBody>
+          <a:bodyPr wrap="square" rtlCol="0">
+            <a:spAutoFit/>
+          </a:bodyPr>
+          <a:lstStyle/>
+          <a:p>
+            <a:r>
+              <a:rPr lang="en-US" altLang="ko-KR" sz="2400" dirty="0"/>
+              <a:t>All data updates every 30 minutes.</a:t>
+            </a:r>
+            <a:endParaRPr lang="ko-KR" altLang="en-US" sz="2400" dirty="0"/>
+          </a:p>
+        </p:txBody>
+      </p:sp>
       <p:pic>
         <p:nvPicPr>
-          <p:cNvPr id="7" name="그림 6">
+          <p:cNvPr id="16" name="그림 15">
             <a:extLst>
               <a:ext uri="{FF2B5EF4-FFF2-40B4-BE49-F238E27FC236}">
-                <a16:creationId xmlns:a16="http://schemas.microsoft.com/office/drawing/2014/main" id="{0539E591-7C90-6248-3A1D-CD2AA48EE853}"/>
+                <a16:creationId xmlns:a16="http://schemas.microsoft.com/office/drawing/2014/main" id="{1AF1FB8A-1875-4AF8-400D-8AA106F5FB59}"/>
               </a:ext>
             </a:extLst>
           </p:cNvPr>
@@ -6891,73 +6998,7 @@
         </p:blipFill>
         <p:spPr>
           <a:xfrm>
-            <a:off x="310985" y="4068076"/>
-            <a:ext cx="6906589" cy="733527"/>
-          </a:xfrm>
-          <a:prstGeom prst="rect">
-            <a:avLst/>
-          </a:prstGeom>
-        </p:spPr>
-      </p:pic>
-      <p:sp>
-        <p:nvSpPr>
-          <p:cNvPr id="9" name="TextBox 8">
-            <a:extLst>
-              <a:ext uri="{FF2B5EF4-FFF2-40B4-BE49-F238E27FC236}">
-                <a16:creationId xmlns:a16="http://schemas.microsoft.com/office/drawing/2014/main" id="{02AED5E3-6C34-4BEE-3750-B1C26CE4D8D0}"/>
-              </a:ext>
-            </a:extLst>
-          </p:cNvPr>
-          <p:cNvSpPr txBox="1"/>
-          <p:nvPr/>
-        </p:nvSpPr>
-        <p:spPr>
-          <a:xfrm>
-            <a:off x="310984" y="5024179"/>
-            <a:ext cx="7244245" cy="461665"/>
-          </a:xfrm>
-          <a:prstGeom prst="rect">
-            <a:avLst/>
-          </a:prstGeom>
-          <a:noFill/>
-        </p:spPr>
-        <p:txBody>
-          <a:bodyPr wrap="square" rtlCol="0">
-            <a:spAutoFit/>
-          </a:bodyPr>
-          <a:lstStyle/>
-          <a:p>
-            <a:r>
-              <a:rPr lang="en-US" altLang="ko-KR" sz="2400" dirty="0"/>
-              <a:t>All data updates every 30 minutes.</a:t>
-            </a:r>
-            <a:endParaRPr lang="ko-KR" altLang="en-US" sz="2400" dirty="0"/>
-          </a:p>
-        </p:txBody>
-      </p:sp>
-      <p:pic>
-        <p:nvPicPr>
-          <p:cNvPr id="16" name="그림 15">
-            <a:extLst>
-              <a:ext uri="{FF2B5EF4-FFF2-40B4-BE49-F238E27FC236}">
-                <a16:creationId xmlns:a16="http://schemas.microsoft.com/office/drawing/2014/main" id="{1AF1FB8A-1875-4AF8-400D-8AA106F5FB59}"/>
-              </a:ext>
-            </a:extLst>
-          </p:cNvPr>
-          <p:cNvPicPr>
-            <a:picLocks noChangeAspect="1"/>
-          </p:cNvPicPr>
-          <p:nvPr/>
-        </p:nvPicPr>
-        <p:blipFill>
-          <a:blip r:embed="rId4"/>
-          <a:stretch>
-            <a:fillRect/>
-          </a:stretch>
-        </p:blipFill>
-        <p:spPr>
-          <a:xfrm>
-            <a:off x="310984" y="1057787"/>
+            <a:off x="310984" y="763515"/>
             <a:ext cx="1848108" cy="314369"/>
           </a:xfrm>
           <a:prstGeom prst="rect">
@@ -6980,6 +7021,36 @@
           <p:nvPr/>
         </p:nvPicPr>
         <p:blipFill>
+          <a:blip r:embed="rId4"/>
+          <a:stretch>
+            <a:fillRect/>
+          </a:stretch>
+        </p:blipFill>
+        <p:spPr>
+          <a:xfrm>
+            <a:off x="2299804" y="729128"/>
+            <a:ext cx="1905266" cy="485843"/>
+          </a:xfrm>
+          <a:prstGeom prst="rect">
+            <a:avLst/>
+          </a:prstGeom>
+        </p:spPr>
+      </p:pic>
+      <p:pic>
+        <p:nvPicPr>
+          <p:cNvPr id="5" name="그림 4">
+            <a:extLst>
+              <a:ext uri="{FF2B5EF4-FFF2-40B4-BE49-F238E27FC236}">
+                <a16:creationId xmlns:a16="http://schemas.microsoft.com/office/drawing/2014/main" id="{A7F07BA9-9FC6-61D5-7330-2ED4931E3A67}"/>
+              </a:ext>
+            </a:extLst>
+          </p:cNvPr>
+          <p:cNvPicPr>
+            <a:picLocks noChangeAspect="1"/>
+          </p:cNvPicPr>
+          <p:nvPr/>
+        </p:nvPicPr>
+        <p:blipFill>
           <a:blip r:embed="rId5"/>
           <a:stretch>
             <a:fillRect/>
@@ -6987,8 +7058,38 @@
         </p:blipFill>
         <p:spPr>
           <a:xfrm>
-            <a:off x="310984" y="2457973"/>
-            <a:ext cx="1905266" cy="485843"/>
+            <a:off x="310984" y="1691565"/>
+            <a:ext cx="6381387" cy="3474870"/>
+          </a:xfrm>
+          <a:prstGeom prst="rect">
+            <a:avLst/>
+          </a:prstGeom>
+        </p:spPr>
+      </p:pic>
+      <p:pic>
+        <p:nvPicPr>
+          <p:cNvPr id="8" name="그림 7">
+            <a:extLst>
+              <a:ext uri="{FF2B5EF4-FFF2-40B4-BE49-F238E27FC236}">
+                <a16:creationId xmlns:a16="http://schemas.microsoft.com/office/drawing/2014/main" id="{EBDEE35E-C35C-CEA4-0566-2376C186D55A}"/>
+              </a:ext>
+            </a:extLst>
+          </p:cNvPr>
+          <p:cNvPicPr>
+            <a:picLocks noChangeAspect="1"/>
+          </p:cNvPicPr>
+          <p:nvPr/>
+        </p:nvPicPr>
+        <p:blipFill>
+          <a:blip r:embed="rId6"/>
+          <a:stretch>
+            <a:fillRect/>
+          </a:stretch>
+        </p:blipFill>
+        <p:spPr>
+          <a:xfrm>
+            <a:off x="310984" y="5665889"/>
+            <a:ext cx="5439534" cy="514422"/>
           </a:xfrm>
           <a:prstGeom prst="rect">
             <a:avLst/>
@@ -7947,538 +8048,6 @@
         <p:cNvPr id="1" name="">
           <a:extLst>
             <a:ext uri="{FF2B5EF4-FFF2-40B4-BE49-F238E27FC236}">
-              <a16:creationId xmlns:a16="http://schemas.microsoft.com/office/drawing/2014/main" id="{FE8E85A6-2736-6042-97DB-64B8E9E95C9D}"/>
-            </a:ext>
-          </a:extLst>
-        </p:cNvPr>
-        <p:cNvGrpSpPr/>
-        <p:nvPr/>
-      </p:nvGrpSpPr>
-      <p:grpSpPr>
-        <a:xfrm>
-          <a:off x="0" y="0"/>
-          <a:ext cx="0" cy="0"/>
-          <a:chOff x="0" y="0"/>
-          <a:chExt cx="0" cy="0"/>
-        </a:xfrm>
-      </p:grpSpPr>
-      <p:sp>
-        <p:nvSpPr>
-          <p:cNvPr id="2" name="Slide Number Placeholder 1">
-            <a:extLst>
-              <a:ext uri="{FF2B5EF4-FFF2-40B4-BE49-F238E27FC236}">
-                <a16:creationId xmlns:a16="http://schemas.microsoft.com/office/drawing/2014/main" id="{D7161F6A-4C48-E993-616A-5BD91FFD9973}"/>
-              </a:ext>
-            </a:extLst>
-          </p:cNvPr>
-          <p:cNvSpPr>
-            <a:spLocks noGrp="1"/>
-          </p:cNvSpPr>
-          <p:nvPr>
-            <p:ph type="sldNum" sz="quarter" idx="12"/>
-          </p:nvPr>
-        </p:nvSpPr>
-        <p:spPr/>
-        <p:txBody>
-          <a:bodyPr/>
-          <a:lstStyle/>
-          <a:p>
-            <a:fld id="{84F9B66E-A506-4F32-84E5-F344782BD9BA}" type="slidenum">
-              <a:rPr lang="ko-KR" altLang="en-US" smtClean="0"/>
-              <a:t>4</a:t>
-            </a:fld>
-            <a:endParaRPr lang="ko-KR" altLang="en-US" dirty="0"/>
-          </a:p>
-        </p:txBody>
-      </p:sp>
-      <p:sp>
-        <p:nvSpPr>
-          <p:cNvPr id="4" name="TextBox 3">
-            <a:extLst>
-              <a:ext uri="{FF2B5EF4-FFF2-40B4-BE49-F238E27FC236}">
-                <a16:creationId xmlns:a16="http://schemas.microsoft.com/office/drawing/2014/main" id="{5B4ADF4C-5528-9643-3309-47AF846F9A94}"/>
-              </a:ext>
-            </a:extLst>
-          </p:cNvPr>
-          <p:cNvSpPr txBox="1"/>
-          <p:nvPr/>
-        </p:nvSpPr>
-        <p:spPr>
-          <a:xfrm>
-            <a:off x="114300" y="148856"/>
-            <a:ext cx="6086923" cy="461665"/>
-          </a:xfrm>
-          <a:prstGeom prst="rect">
-            <a:avLst/>
-          </a:prstGeom>
-          <a:noFill/>
-          <a:ln>
-            <a:solidFill>
-              <a:schemeClr val="tx1"/>
-            </a:solidFill>
-          </a:ln>
-        </p:spPr>
-        <p:txBody>
-          <a:bodyPr wrap="none" rtlCol="0">
-            <a:spAutoFit/>
-          </a:bodyPr>
-          <a:lstStyle/>
-          <a:p>
-            <a:r>
-              <a:rPr lang="en-US" altLang="ko-KR" sz="2400" b="1" dirty="0"/>
-              <a:t>User Interface Design – Header &amp; Footer</a:t>
-            </a:r>
-          </a:p>
-        </p:txBody>
-      </p:sp>
-      <p:pic>
-        <p:nvPicPr>
-          <p:cNvPr id="9" name="그림 8">
-            <a:extLst>
-              <a:ext uri="{FF2B5EF4-FFF2-40B4-BE49-F238E27FC236}">
-                <a16:creationId xmlns:a16="http://schemas.microsoft.com/office/drawing/2014/main" id="{A7805010-65CF-1F69-993C-4460A682B37A}"/>
-              </a:ext>
-            </a:extLst>
-          </p:cNvPr>
-          <p:cNvPicPr>
-            <a:picLocks noChangeAspect="1"/>
-          </p:cNvPicPr>
-          <p:nvPr/>
-        </p:nvPicPr>
-        <p:blipFill>
-          <a:blip r:embed="rId3"/>
-          <a:srcRect b="74814"/>
-          <a:stretch/>
-        </p:blipFill>
-        <p:spPr>
-          <a:xfrm>
-            <a:off x="281361" y="886845"/>
-            <a:ext cx="9343278" cy="1090545"/>
-          </a:xfrm>
-          <a:prstGeom prst="rect">
-            <a:avLst/>
-          </a:prstGeom>
-        </p:spPr>
-      </p:pic>
-      <p:sp>
-        <p:nvSpPr>
-          <p:cNvPr id="6" name="TextBox 5">
-            <a:extLst>
-              <a:ext uri="{FF2B5EF4-FFF2-40B4-BE49-F238E27FC236}">
-                <a16:creationId xmlns:a16="http://schemas.microsoft.com/office/drawing/2014/main" id="{777E2D4F-BFA9-A39B-5FCC-36E73EA189B6}"/>
-              </a:ext>
-            </a:extLst>
-          </p:cNvPr>
-          <p:cNvSpPr txBox="1"/>
-          <p:nvPr/>
-        </p:nvSpPr>
-        <p:spPr>
-          <a:xfrm>
-            <a:off x="5388293" y="2253714"/>
-            <a:ext cx="3600450" cy="707886"/>
-          </a:xfrm>
-          <a:prstGeom prst="rect">
-            <a:avLst/>
-          </a:prstGeom>
-          <a:noFill/>
-        </p:spPr>
-        <p:txBody>
-          <a:bodyPr wrap="square" rtlCol="0">
-            <a:spAutoFit/>
-          </a:bodyPr>
-          <a:lstStyle/>
-          <a:p>
-            <a:r>
-              <a:rPr lang="en-US" altLang="ko-KR" sz="2000" dirty="0"/>
-              <a:t>Implemented with &lt;header&gt; and &lt;footer&gt; tag.</a:t>
-            </a:r>
-            <a:endParaRPr lang="ko-KR" altLang="en-US" sz="2000" dirty="0"/>
-          </a:p>
-        </p:txBody>
-      </p:sp>
-      <p:pic>
-        <p:nvPicPr>
-          <p:cNvPr id="8" name="그림 7">
-            <a:extLst>
-              <a:ext uri="{FF2B5EF4-FFF2-40B4-BE49-F238E27FC236}">
-                <a16:creationId xmlns:a16="http://schemas.microsoft.com/office/drawing/2014/main" id="{1AF2F70A-C342-3DF2-1441-A95483686CB2}"/>
-              </a:ext>
-            </a:extLst>
-          </p:cNvPr>
-          <p:cNvPicPr>
-            <a:picLocks noChangeAspect="1"/>
-          </p:cNvPicPr>
-          <p:nvPr/>
-        </p:nvPicPr>
-        <p:blipFill>
-          <a:blip r:embed="rId4"/>
-          <a:stretch>
-            <a:fillRect/>
-          </a:stretch>
-        </p:blipFill>
-        <p:spPr>
-          <a:xfrm>
-            <a:off x="281361" y="2253715"/>
-            <a:ext cx="4744112" cy="4077269"/>
-          </a:xfrm>
-          <a:prstGeom prst="rect">
-            <a:avLst/>
-          </a:prstGeom>
-        </p:spPr>
-      </p:pic>
-      <p:sp>
-        <p:nvSpPr>
-          <p:cNvPr id="10" name="TextBox 9">
-            <a:extLst>
-              <a:ext uri="{FF2B5EF4-FFF2-40B4-BE49-F238E27FC236}">
-                <a16:creationId xmlns:a16="http://schemas.microsoft.com/office/drawing/2014/main" id="{6C0A5391-3634-867C-E317-079773A7DD22}"/>
-              </a:ext>
-            </a:extLst>
-          </p:cNvPr>
-          <p:cNvSpPr txBox="1"/>
-          <p:nvPr/>
-        </p:nvSpPr>
-        <p:spPr>
-          <a:xfrm>
-            <a:off x="5388293" y="3136612"/>
-            <a:ext cx="2893741" cy="584775"/>
-          </a:xfrm>
-          <a:prstGeom prst="rect">
-            <a:avLst/>
-          </a:prstGeom>
-          <a:noFill/>
-        </p:spPr>
-        <p:txBody>
-          <a:bodyPr wrap="none" rtlCol="0">
-            <a:spAutoFit/>
-          </a:bodyPr>
-          <a:lstStyle/>
-          <a:p>
-            <a:r>
-              <a:rPr lang="en-US" altLang="ko-KR" sz="3200" b="1" dirty="0">
-                <a:solidFill>
-                  <a:srgbClr val="FF0000"/>
-                </a:solidFill>
-              </a:rPr>
-              <a:t>Special Point!</a:t>
-            </a:r>
-            <a:endParaRPr lang="ko-KR" altLang="en-US" sz="3200" b="1" dirty="0">
-              <a:solidFill>
-                <a:srgbClr val="FF0000"/>
-              </a:solidFill>
-            </a:endParaRPr>
-          </a:p>
-        </p:txBody>
-      </p:sp>
-      <p:sp>
-        <p:nvSpPr>
-          <p:cNvPr id="11" name="TextBox 10">
-            <a:extLst>
-              <a:ext uri="{FF2B5EF4-FFF2-40B4-BE49-F238E27FC236}">
-                <a16:creationId xmlns:a16="http://schemas.microsoft.com/office/drawing/2014/main" id="{F93E9E00-294F-8FD5-1834-FCA8A50D4B11}"/>
-              </a:ext>
-            </a:extLst>
-          </p:cNvPr>
-          <p:cNvSpPr txBox="1"/>
-          <p:nvPr/>
-        </p:nvSpPr>
-        <p:spPr>
-          <a:xfrm>
-            <a:off x="5388293" y="3738300"/>
-            <a:ext cx="3600450" cy="2308324"/>
-          </a:xfrm>
-          <a:prstGeom prst="rect">
-            <a:avLst/>
-          </a:prstGeom>
-          <a:noFill/>
-        </p:spPr>
-        <p:txBody>
-          <a:bodyPr wrap="square" rtlCol="0">
-            <a:spAutoFit/>
-          </a:bodyPr>
-          <a:lstStyle/>
-          <a:p>
-            <a:r>
-              <a:rPr lang="en-US" altLang="ko-KR" sz="2400" dirty="0"/>
-              <a:t>The header &amp; footer changes its color depending on the air quality index (AQI), specifically the concentration of PM 2.5.</a:t>
-            </a:r>
-            <a:endParaRPr lang="ko-KR" altLang="en-US" sz="2400" dirty="0"/>
-          </a:p>
-        </p:txBody>
-      </p:sp>
-    </p:spTree>
-    <p:extLst>
-      <p:ext uri="{BB962C8B-B14F-4D97-AF65-F5344CB8AC3E}">
-        <p14:creationId xmlns:p14="http://schemas.microsoft.com/office/powerpoint/2010/main" val="1455050363"/>
-      </p:ext>
-    </p:extLst>
-  </p:cSld>
-  <p:clrMapOvr>
-    <a:masterClrMapping/>
-  </p:clrMapOvr>
-</p:sld>
-</file>
-
-<file path=ppt/slides/slide5.xml><?xml version="1.0" encoding="utf-8"?>
-<p:sld xmlns:a="http://schemas.openxmlformats.org/drawingml/2006/main" xmlns:r="http://schemas.openxmlformats.org/officeDocument/2006/relationships" xmlns:p="http://schemas.openxmlformats.org/presentationml/2006/main">
-  <p:cSld>
-    <p:spTree>
-      <p:nvGrpSpPr>
-        <p:cNvPr id="1" name="">
-          <a:extLst>
-            <a:ext uri="{FF2B5EF4-FFF2-40B4-BE49-F238E27FC236}">
-              <a16:creationId xmlns:a16="http://schemas.microsoft.com/office/drawing/2014/main" id="{61EC9141-68B9-23A1-65D7-F809A2F3BB45}"/>
-            </a:ext>
-          </a:extLst>
-        </p:cNvPr>
-        <p:cNvGrpSpPr/>
-        <p:nvPr/>
-      </p:nvGrpSpPr>
-      <p:grpSpPr>
-        <a:xfrm>
-          <a:off x="0" y="0"/>
-          <a:ext cx="0" cy="0"/>
-          <a:chOff x="0" y="0"/>
-          <a:chExt cx="0" cy="0"/>
-        </a:xfrm>
-      </p:grpSpPr>
-      <p:sp>
-        <p:nvSpPr>
-          <p:cNvPr id="2" name="Slide Number Placeholder 1">
-            <a:extLst>
-              <a:ext uri="{FF2B5EF4-FFF2-40B4-BE49-F238E27FC236}">
-                <a16:creationId xmlns:a16="http://schemas.microsoft.com/office/drawing/2014/main" id="{A32F5EB1-112D-054E-4B6B-AAB67040BE88}"/>
-              </a:ext>
-            </a:extLst>
-          </p:cNvPr>
-          <p:cNvSpPr>
-            <a:spLocks noGrp="1"/>
-          </p:cNvSpPr>
-          <p:nvPr>
-            <p:ph type="sldNum" sz="quarter" idx="12"/>
-          </p:nvPr>
-        </p:nvSpPr>
-        <p:spPr/>
-        <p:txBody>
-          <a:bodyPr/>
-          <a:lstStyle/>
-          <a:p>
-            <a:fld id="{84F9B66E-A506-4F32-84E5-F344782BD9BA}" type="slidenum">
-              <a:rPr lang="ko-KR" altLang="en-US" smtClean="0"/>
-              <a:t>5</a:t>
-            </a:fld>
-            <a:endParaRPr lang="ko-KR" altLang="en-US" dirty="0"/>
-          </a:p>
-        </p:txBody>
-      </p:sp>
-      <p:sp>
-        <p:nvSpPr>
-          <p:cNvPr id="4" name="TextBox 3">
-            <a:extLst>
-              <a:ext uri="{FF2B5EF4-FFF2-40B4-BE49-F238E27FC236}">
-                <a16:creationId xmlns:a16="http://schemas.microsoft.com/office/drawing/2014/main" id="{E3E78C36-B82A-676D-04C6-8981B83882F8}"/>
-              </a:ext>
-            </a:extLst>
-          </p:cNvPr>
-          <p:cNvSpPr txBox="1"/>
-          <p:nvPr/>
-        </p:nvSpPr>
-        <p:spPr>
-          <a:xfrm>
-            <a:off x="114300" y="148856"/>
-            <a:ext cx="5864106" cy="461665"/>
-          </a:xfrm>
-          <a:prstGeom prst="rect">
-            <a:avLst/>
-          </a:prstGeom>
-          <a:noFill/>
-          <a:ln>
-            <a:solidFill>
-              <a:schemeClr val="tx1"/>
-            </a:solidFill>
-          </a:ln>
-        </p:spPr>
-        <p:txBody>
-          <a:bodyPr wrap="none" rtlCol="0">
-            <a:spAutoFit/>
-          </a:bodyPr>
-          <a:lstStyle/>
-          <a:p>
-            <a:r>
-              <a:rPr lang="en-US" altLang="ko-KR" sz="2400" b="1" dirty="0"/>
-              <a:t>User Interface Design – Navigation Bar</a:t>
-            </a:r>
-          </a:p>
-        </p:txBody>
-      </p:sp>
-      <p:sp>
-        <p:nvSpPr>
-          <p:cNvPr id="11" name="TextBox 10">
-            <a:extLst>
-              <a:ext uri="{FF2B5EF4-FFF2-40B4-BE49-F238E27FC236}">
-                <a16:creationId xmlns:a16="http://schemas.microsoft.com/office/drawing/2014/main" id="{553631C5-9B03-272A-BD7C-9AB795CA4B9D}"/>
-              </a:ext>
-            </a:extLst>
-          </p:cNvPr>
-          <p:cNvSpPr txBox="1"/>
-          <p:nvPr/>
-        </p:nvSpPr>
-        <p:spPr>
-          <a:xfrm>
-            <a:off x="4228342" y="741910"/>
-            <a:ext cx="4414803" cy="1569660"/>
-          </a:xfrm>
-          <a:prstGeom prst="rect">
-            <a:avLst/>
-          </a:prstGeom>
-          <a:noFill/>
-        </p:spPr>
-        <p:txBody>
-          <a:bodyPr wrap="square" rtlCol="0">
-            <a:spAutoFit/>
-          </a:bodyPr>
-          <a:lstStyle/>
-          <a:p>
-            <a:r>
-              <a:rPr lang="en-US" altLang="ko-KR" sz="2400" dirty="0"/>
-              <a:t>The footer contains the navigation bar. Each options take a user to dedicated section of the page.</a:t>
-            </a:r>
-            <a:endParaRPr lang="ko-KR" altLang="en-US" sz="2400" dirty="0"/>
-          </a:p>
-        </p:txBody>
-      </p:sp>
-      <p:sp>
-        <p:nvSpPr>
-          <p:cNvPr id="12" name="TextBox 11">
-            <a:extLst>
-              <a:ext uri="{FF2B5EF4-FFF2-40B4-BE49-F238E27FC236}">
-                <a16:creationId xmlns:a16="http://schemas.microsoft.com/office/drawing/2014/main" id="{B5C5A45A-571C-EBA2-3E50-4B1369C7579E}"/>
-              </a:ext>
-            </a:extLst>
-          </p:cNvPr>
-          <p:cNvSpPr txBox="1"/>
-          <p:nvPr/>
-        </p:nvSpPr>
-        <p:spPr>
-          <a:xfrm>
-            <a:off x="6629399" y="3210636"/>
-            <a:ext cx="3097531" cy="1938992"/>
-          </a:xfrm>
-          <a:prstGeom prst="rect">
-            <a:avLst/>
-          </a:prstGeom>
-          <a:noFill/>
-        </p:spPr>
-        <p:txBody>
-          <a:bodyPr wrap="square" rtlCol="0">
-            <a:spAutoFit/>
-          </a:bodyPr>
-          <a:lstStyle/>
-          <a:p>
-            <a:r>
-              <a:rPr lang="en-US" altLang="ko-KR" sz="2400" dirty="0"/>
-              <a:t>Implemented with &lt;nav&gt;</a:t>
-            </a:r>
-            <a:r>
-              <a:rPr lang="ko-KR" altLang="en-US" sz="2400" dirty="0"/>
-              <a:t> </a:t>
-            </a:r>
-            <a:r>
-              <a:rPr lang="en-US" altLang="ko-KR" sz="2400" dirty="0"/>
-              <a:t>and</a:t>
-            </a:r>
-            <a:r>
-              <a:rPr lang="ko-KR" altLang="en-US" sz="2400" dirty="0"/>
-              <a:t> </a:t>
-            </a:r>
-            <a:r>
-              <a:rPr lang="en-US" altLang="ko-KR" sz="2400" dirty="0"/>
-              <a:t>&lt;section&gt;. The scroll moves to each point by clicking the options.</a:t>
-            </a:r>
-            <a:endParaRPr lang="ko-KR" altLang="en-US" sz="2400" dirty="0"/>
-          </a:p>
-        </p:txBody>
-      </p:sp>
-      <p:pic>
-        <p:nvPicPr>
-          <p:cNvPr id="5" name="그림 4">
-            <a:extLst>
-              <a:ext uri="{FF2B5EF4-FFF2-40B4-BE49-F238E27FC236}">
-                <a16:creationId xmlns:a16="http://schemas.microsoft.com/office/drawing/2014/main" id="{4016D542-A6EC-7EE6-BBB3-B2B953C6D0CB}"/>
-              </a:ext>
-            </a:extLst>
-          </p:cNvPr>
-          <p:cNvPicPr>
-            <a:picLocks noChangeAspect="1"/>
-          </p:cNvPicPr>
-          <p:nvPr/>
-        </p:nvPicPr>
-        <p:blipFill>
-          <a:blip r:embed="rId3"/>
-          <a:srcRect l="41890" t="77845" r="39327"/>
-          <a:stretch/>
-        </p:blipFill>
-        <p:spPr>
-          <a:xfrm>
-            <a:off x="320039" y="741910"/>
-            <a:ext cx="3574893" cy="1932709"/>
-          </a:xfrm>
-          <a:prstGeom prst="rect">
-            <a:avLst/>
-          </a:prstGeom>
-        </p:spPr>
-      </p:pic>
-      <p:pic>
-        <p:nvPicPr>
-          <p:cNvPr id="8" name="그림 7">
-            <a:extLst>
-              <a:ext uri="{FF2B5EF4-FFF2-40B4-BE49-F238E27FC236}">
-                <a16:creationId xmlns:a16="http://schemas.microsoft.com/office/drawing/2014/main" id="{7D676C25-3022-F941-0044-F0D6FD57A36C}"/>
-              </a:ext>
-            </a:extLst>
-          </p:cNvPr>
-          <p:cNvPicPr>
-            <a:picLocks noChangeAspect="1"/>
-          </p:cNvPicPr>
-          <p:nvPr/>
-        </p:nvPicPr>
-        <p:blipFill>
-          <a:blip r:embed="rId4"/>
-          <a:stretch>
-            <a:fillRect/>
-          </a:stretch>
-        </p:blipFill>
-        <p:spPr>
-          <a:xfrm>
-            <a:off x="320039" y="3210636"/>
-            <a:ext cx="6173061" cy="2991267"/>
-          </a:xfrm>
-          <a:prstGeom prst="rect">
-            <a:avLst/>
-          </a:prstGeom>
-        </p:spPr>
-      </p:pic>
-    </p:spTree>
-    <p:extLst>
-      <p:ext uri="{BB962C8B-B14F-4D97-AF65-F5344CB8AC3E}">
-        <p14:creationId xmlns:p14="http://schemas.microsoft.com/office/powerpoint/2010/main" val="1190513628"/>
-      </p:ext>
-    </p:extLst>
-  </p:cSld>
-  <p:clrMapOvr>
-    <a:masterClrMapping/>
-  </p:clrMapOvr>
-</p:sld>
-</file>
-
-<file path=ppt/slides/slide6.xml><?xml version="1.0" encoding="utf-8"?>
-<p:sld xmlns:a="http://schemas.openxmlformats.org/drawingml/2006/main" xmlns:r="http://schemas.openxmlformats.org/officeDocument/2006/relationships" xmlns:p="http://schemas.openxmlformats.org/presentationml/2006/main">
-  <p:cSld>
-    <p:spTree>
-      <p:nvGrpSpPr>
-        <p:cNvPr id="1" name="">
-          <a:extLst>
-            <a:ext uri="{FF2B5EF4-FFF2-40B4-BE49-F238E27FC236}">
               <a16:creationId xmlns:a16="http://schemas.microsoft.com/office/drawing/2014/main" id="{1C19B210-D175-DD56-43DE-AA2DCD8AA438}"/>
             </a:ext>
           </a:extLst>
@@ -8517,7 +8086,7 @@
           <a:p>
             <a:fld id="{84F9B66E-A506-4F32-84E5-F344782BD9BA}" type="slidenum">
               <a:rPr lang="ko-KR" altLang="en-US" smtClean="0"/>
-              <a:t>6</a:t>
+              <a:t>4</a:t>
             </a:fld>
             <a:endParaRPr lang="ko-KR" altLang="en-US" dirty="0"/>
           </a:p>
@@ -8844,6 +8413,538 @@
     <p:extLst>
       <p:ext uri="{BB962C8B-B14F-4D97-AF65-F5344CB8AC3E}">
         <p14:creationId xmlns:p14="http://schemas.microsoft.com/office/powerpoint/2010/main" val="3165372148"/>
+      </p:ext>
+    </p:extLst>
+  </p:cSld>
+  <p:clrMapOvr>
+    <a:masterClrMapping/>
+  </p:clrMapOvr>
+</p:sld>
+</file>
+
+<file path=ppt/slides/slide5.xml><?xml version="1.0" encoding="utf-8"?>
+<p:sld xmlns:a="http://schemas.openxmlformats.org/drawingml/2006/main" xmlns:r="http://schemas.openxmlformats.org/officeDocument/2006/relationships" xmlns:p="http://schemas.openxmlformats.org/presentationml/2006/main">
+  <p:cSld>
+    <p:spTree>
+      <p:nvGrpSpPr>
+        <p:cNvPr id="1" name="">
+          <a:extLst>
+            <a:ext uri="{FF2B5EF4-FFF2-40B4-BE49-F238E27FC236}">
+              <a16:creationId xmlns:a16="http://schemas.microsoft.com/office/drawing/2014/main" id="{FE8E85A6-2736-6042-97DB-64B8E9E95C9D}"/>
+            </a:ext>
+          </a:extLst>
+        </p:cNvPr>
+        <p:cNvGrpSpPr/>
+        <p:nvPr/>
+      </p:nvGrpSpPr>
+      <p:grpSpPr>
+        <a:xfrm>
+          <a:off x="0" y="0"/>
+          <a:ext cx="0" cy="0"/>
+          <a:chOff x="0" y="0"/>
+          <a:chExt cx="0" cy="0"/>
+        </a:xfrm>
+      </p:grpSpPr>
+      <p:sp>
+        <p:nvSpPr>
+          <p:cNvPr id="2" name="Slide Number Placeholder 1">
+            <a:extLst>
+              <a:ext uri="{FF2B5EF4-FFF2-40B4-BE49-F238E27FC236}">
+                <a16:creationId xmlns:a16="http://schemas.microsoft.com/office/drawing/2014/main" id="{D7161F6A-4C48-E993-616A-5BD91FFD9973}"/>
+              </a:ext>
+            </a:extLst>
+          </p:cNvPr>
+          <p:cNvSpPr>
+            <a:spLocks noGrp="1"/>
+          </p:cNvSpPr>
+          <p:nvPr>
+            <p:ph type="sldNum" sz="quarter" idx="12"/>
+          </p:nvPr>
+        </p:nvSpPr>
+        <p:spPr/>
+        <p:txBody>
+          <a:bodyPr/>
+          <a:lstStyle/>
+          <a:p>
+            <a:fld id="{84F9B66E-A506-4F32-84E5-F344782BD9BA}" type="slidenum">
+              <a:rPr lang="ko-KR" altLang="en-US" smtClean="0"/>
+              <a:t>5</a:t>
+            </a:fld>
+            <a:endParaRPr lang="ko-KR" altLang="en-US" dirty="0"/>
+          </a:p>
+        </p:txBody>
+      </p:sp>
+      <p:sp>
+        <p:nvSpPr>
+          <p:cNvPr id="4" name="TextBox 3">
+            <a:extLst>
+              <a:ext uri="{FF2B5EF4-FFF2-40B4-BE49-F238E27FC236}">
+                <a16:creationId xmlns:a16="http://schemas.microsoft.com/office/drawing/2014/main" id="{5B4ADF4C-5528-9643-3309-47AF846F9A94}"/>
+              </a:ext>
+            </a:extLst>
+          </p:cNvPr>
+          <p:cNvSpPr txBox="1"/>
+          <p:nvPr/>
+        </p:nvSpPr>
+        <p:spPr>
+          <a:xfrm>
+            <a:off x="114300" y="148856"/>
+            <a:ext cx="6086923" cy="461665"/>
+          </a:xfrm>
+          <a:prstGeom prst="rect">
+            <a:avLst/>
+          </a:prstGeom>
+          <a:noFill/>
+          <a:ln>
+            <a:solidFill>
+              <a:schemeClr val="tx1"/>
+            </a:solidFill>
+          </a:ln>
+        </p:spPr>
+        <p:txBody>
+          <a:bodyPr wrap="none" rtlCol="0">
+            <a:spAutoFit/>
+          </a:bodyPr>
+          <a:lstStyle/>
+          <a:p>
+            <a:r>
+              <a:rPr lang="en-US" altLang="ko-KR" sz="2400" b="1" dirty="0"/>
+              <a:t>User Interface Design – Header &amp; Footer</a:t>
+            </a:r>
+          </a:p>
+        </p:txBody>
+      </p:sp>
+      <p:pic>
+        <p:nvPicPr>
+          <p:cNvPr id="9" name="그림 8">
+            <a:extLst>
+              <a:ext uri="{FF2B5EF4-FFF2-40B4-BE49-F238E27FC236}">
+                <a16:creationId xmlns:a16="http://schemas.microsoft.com/office/drawing/2014/main" id="{A7805010-65CF-1F69-993C-4460A682B37A}"/>
+              </a:ext>
+            </a:extLst>
+          </p:cNvPr>
+          <p:cNvPicPr>
+            <a:picLocks noChangeAspect="1"/>
+          </p:cNvPicPr>
+          <p:nvPr/>
+        </p:nvPicPr>
+        <p:blipFill>
+          <a:blip r:embed="rId3"/>
+          <a:srcRect b="74814"/>
+          <a:stretch/>
+        </p:blipFill>
+        <p:spPr>
+          <a:xfrm>
+            <a:off x="281361" y="886845"/>
+            <a:ext cx="9343278" cy="1090545"/>
+          </a:xfrm>
+          <a:prstGeom prst="rect">
+            <a:avLst/>
+          </a:prstGeom>
+        </p:spPr>
+      </p:pic>
+      <p:sp>
+        <p:nvSpPr>
+          <p:cNvPr id="6" name="TextBox 5">
+            <a:extLst>
+              <a:ext uri="{FF2B5EF4-FFF2-40B4-BE49-F238E27FC236}">
+                <a16:creationId xmlns:a16="http://schemas.microsoft.com/office/drawing/2014/main" id="{777E2D4F-BFA9-A39B-5FCC-36E73EA189B6}"/>
+              </a:ext>
+            </a:extLst>
+          </p:cNvPr>
+          <p:cNvSpPr txBox="1"/>
+          <p:nvPr/>
+        </p:nvSpPr>
+        <p:spPr>
+          <a:xfrm>
+            <a:off x="5388293" y="2253714"/>
+            <a:ext cx="3600450" cy="707886"/>
+          </a:xfrm>
+          <a:prstGeom prst="rect">
+            <a:avLst/>
+          </a:prstGeom>
+          <a:noFill/>
+        </p:spPr>
+        <p:txBody>
+          <a:bodyPr wrap="square" rtlCol="0">
+            <a:spAutoFit/>
+          </a:bodyPr>
+          <a:lstStyle/>
+          <a:p>
+            <a:r>
+              <a:rPr lang="en-US" altLang="ko-KR" sz="2000" dirty="0"/>
+              <a:t>Implemented with &lt;header&gt; and &lt;footer&gt; tag.</a:t>
+            </a:r>
+            <a:endParaRPr lang="ko-KR" altLang="en-US" sz="2000" dirty="0"/>
+          </a:p>
+        </p:txBody>
+      </p:sp>
+      <p:pic>
+        <p:nvPicPr>
+          <p:cNvPr id="8" name="그림 7">
+            <a:extLst>
+              <a:ext uri="{FF2B5EF4-FFF2-40B4-BE49-F238E27FC236}">
+                <a16:creationId xmlns:a16="http://schemas.microsoft.com/office/drawing/2014/main" id="{1AF2F70A-C342-3DF2-1441-A95483686CB2}"/>
+              </a:ext>
+            </a:extLst>
+          </p:cNvPr>
+          <p:cNvPicPr>
+            <a:picLocks noChangeAspect="1"/>
+          </p:cNvPicPr>
+          <p:nvPr/>
+        </p:nvPicPr>
+        <p:blipFill>
+          <a:blip r:embed="rId4"/>
+          <a:stretch>
+            <a:fillRect/>
+          </a:stretch>
+        </p:blipFill>
+        <p:spPr>
+          <a:xfrm>
+            <a:off x="281361" y="2253715"/>
+            <a:ext cx="4744112" cy="4077269"/>
+          </a:xfrm>
+          <a:prstGeom prst="rect">
+            <a:avLst/>
+          </a:prstGeom>
+        </p:spPr>
+      </p:pic>
+      <p:sp>
+        <p:nvSpPr>
+          <p:cNvPr id="10" name="TextBox 9">
+            <a:extLst>
+              <a:ext uri="{FF2B5EF4-FFF2-40B4-BE49-F238E27FC236}">
+                <a16:creationId xmlns:a16="http://schemas.microsoft.com/office/drawing/2014/main" id="{6C0A5391-3634-867C-E317-079773A7DD22}"/>
+              </a:ext>
+            </a:extLst>
+          </p:cNvPr>
+          <p:cNvSpPr txBox="1"/>
+          <p:nvPr/>
+        </p:nvSpPr>
+        <p:spPr>
+          <a:xfrm>
+            <a:off x="5388293" y="3136612"/>
+            <a:ext cx="2893741" cy="584775"/>
+          </a:xfrm>
+          <a:prstGeom prst="rect">
+            <a:avLst/>
+          </a:prstGeom>
+          <a:noFill/>
+        </p:spPr>
+        <p:txBody>
+          <a:bodyPr wrap="none" rtlCol="0">
+            <a:spAutoFit/>
+          </a:bodyPr>
+          <a:lstStyle/>
+          <a:p>
+            <a:r>
+              <a:rPr lang="en-US" altLang="ko-KR" sz="3200" b="1" dirty="0">
+                <a:solidFill>
+                  <a:srgbClr val="FF0000"/>
+                </a:solidFill>
+              </a:rPr>
+              <a:t>Special Point!</a:t>
+            </a:r>
+            <a:endParaRPr lang="ko-KR" altLang="en-US" sz="3200" b="1" dirty="0">
+              <a:solidFill>
+                <a:srgbClr val="FF0000"/>
+              </a:solidFill>
+            </a:endParaRPr>
+          </a:p>
+        </p:txBody>
+      </p:sp>
+      <p:sp>
+        <p:nvSpPr>
+          <p:cNvPr id="11" name="TextBox 10">
+            <a:extLst>
+              <a:ext uri="{FF2B5EF4-FFF2-40B4-BE49-F238E27FC236}">
+                <a16:creationId xmlns:a16="http://schemas.microsoft.com/office/drawing/2014/main" id="{F93E9E00-294F-8FD5-1834-FCA8A50D4B11}"/>
+              </a:ext>
+            </a:extLst>
+          </p:cNvPr>
+          <p:cNvSpPr txBox="1"/>
+          <p:nvPr/>
+        </p:nvSpPr>
+        <p:spPr>
+          <a:xfrm>
+            <a:off x="5388293" y="3738300"/>
+            <a:ext cx="3600450" cy="2308324"/>
+          </a:xfrm>
+          <a:prstGeom prst="rect">
+            <a:avLst/>
+          </a:prstGeom>
+          <a:noFill/>
+        </p:spPr>
+        <p:txBody>
+          <a:bodyPr wrap="square" rtlCol="0">
+            <a:spAutoFit/>
+          </a:bodyPr>
+          <a:lstStyle/>
+          <a:p>
+            <a:r>
+              <a:rPr lang="en-US" altLang="ko-KR" sz="2400" dirty="0"/>
+              <a:t>The header &amp; footer changes its color depending on the air quality index (AQI), specifically the concentration of PM 2.5.</a:t>
+            </a:r>
+            <a:endParaRPr lang="ko-KR" altLang="en-US" sz="2400" dirty="0"/>
+          </a:p>
+        </p:txBody>
+      </p:sp>
+    </p:spTree>
+    <p:extLst>
+      <p:ext uri="{BB962C8B-B14F-4D97-AF65-F5344CB8AC3E}">
+        <p14:creationId xmlns:p14="http://schemas.microsoft.com/office/powerpoint/2010/main" val="1455050363"/>
+      </p:ext>
+    </p:extLst>
+  </p:cSld>
+  <p:clrMapOvr>
+    <a:masterClrMapping/>
+  </p:clrMapOvr>
+</p:sld>
+</file>
+
+<file path=ppt/slides/slide6.xml><?xml version="1.0" encoding="utf-8"?>
+<p:sld xmlns:a="http://schemas.openxmlformats.org/drawingml/2006/main" xmlns:r="http://schemas.openxmlformats.org/officeDocument/2006/relationships" xmlns:p="http://schemas.openxmlformats.org/presentationml/2006/main">
+  <p:cSld>
+    <p:spTree>
+      <p:nvGrpSpPr>
+        <p:cNvPr id="1" name="">
+          <a:extLst>
+            <a:ext uri="{FF2B5EF4-FFF2-40B4-BE49-F238E27FC236}">
+              <a16:creationId xmlns:a16="http://schemas.microsoft.com/office/drawing/2014/main" id="{61EC9141-68B9-23A1-65D7-F809A2F3BB45}"/>
+            </a:ext>
+          </a:extLst>
+        </p:cNvPr>
+        <p:cNvGrpSpPr/>
+        <p:nvPr/>
+      </p:nvGrpSpPr>
+      <p:grpSpPr>
+        <a:xfrm>
+          <a:off x="0" y="0"/>
+          <a:ext cx="0" cy="0"/>
+          <a:chOff x="0" y="0"/>
+          <a:chExt cx="0" cy="0"/>
+        </a:xfrm>
+      </p:grpSpPr>
+      <p:sp>
+        <p:nvSpPr>
+          <p:cNvPr id="2" name="Slide Number Placeholder 1">
+            <a:extLst>
+              <a:ext uri="{FF2B5EF4-FFF2-40B4-BE49-F238E27FC236}">
+                <a16:creationId xmlns:a16="http://schemas.microsoft.com/office/drawing/2014/main" id="{A32F5EB1-112D-054E-4B6B-AAB67040BE88}"/>
+              </a:ext>
+            </a:extLst>
+          </p:cNvPr>
+          <p:cNvSpPr>
+            <a:spLocks noGrp="1"/>
+          </p:cNvSpPr>
+          <p:nvPr>
+            <p:ph type="sldNum" sz="quarter" idx="12"/>
+          </p:nvPr>
+        </p:nvSpPr>
+        <p:spPr/>
+        <p:txBody>
+          <a:bodyPr/>
+          <a:lstStyle/>
+          <a:p>
+            <a:fld id="{84F9B66E-A506-4F32-84E5-F344782BD9BA}" type="slidenum">
+              <a:rPr lang="ko-KR" altLang="en-US" smtClean="0"/>
+              <a:t>6</a:t>
+            </a:fld>
+            <a:endParaRPr lang="ko-KR" altLang="en-US" dirty="0"/>
+          </a:p>
+        </p:txBody>
+      </p:sp>
+      <p:sp>
+        <p:nvSpPr>
+          <p:cNvPr id="4" name="TextBox 3">
+            <a:extLst>
+              <a:ext uri="{FF2B5EF4-FFF2-40B4-BE49-F238E27FC236}">
+                <a16:creationId xmlns:a16="http://schemas.microsoft.com/office/drawing/2014/main" id="{E3E78C36-B82A-676D-04C6-8981B83882F8}"/>
+              </a:ext>
+            </a:extLst>
+          </p:cNvPr>
+          <p:cNvSpPr txBox="1"/>
+          <p:nvPr/>
+        </p:nvSpPr>
+        <p:spPr>
+          <a:xfrm>
+            <a:off x="114300" y="148856"/>
+            <a:ext cx="5864106" cy="461665"/>
+          </a:xfrm>
+          <a:prstGeom prst="rect">
+            <a:avLst/>
+          </a:prstGeom>
+          <a:noFill/>
+          <a:ln>
+            <a:solidFill>
+              <a:schemeClr val="tx1"/>
+            </a:solidFill>
+          </a:ln>
+        </p:spPr>
+        <p:txBody>
+          <a:bodyPr wrap="none" rtlCol="0">
+            <a:spAutoFit/>
+          </a:bodyPr>
+          <a:lstStyle/>
+          <a:p>
+            <a:r>
+              <a:rPr lang="en-US" altLang="ko-KR" sz="2400" b="1" dirty="0"/>
+              <a:t>User Interface Design – Navigation Bar</a:t>
+            </a:r>
+          </a:p>
+        </p:txBody>
+      </p:sp>
+      <p:sp>
+        <p:nvSpPr>
+          <p:cNvPr id="11" name="TextBox 10">
+            <a:extLst>
+              <a:ext uri="{FF2B5EF4-FFF2-40B4-BE49-F238E27FC236}">
+                <a16:creationId xmlns:a16="http://schemas.microsoft.com/office/drawing/2014/main" id="{553631C5-9B03-272A-BD7C-9AB795CA4B9D}"/>
+              </a:ext>
+            </a:extLst>
+          </p:cNvPr>
+          <p:cNvSpPr txBox="1"/>
+          <p:nvPr/>
+        </p:nvSpPr>
+        <p:spPr>
+          <a:xfrm>
+            <a:off x="4228342" y="741910"/>
+            <a:ext cx="4414803" cy="1569660"/>
+          </a:xfrm>
+          <a:prstGeom prst="rect">
+            <a:avLst/>
+          </a:prstGeom>
+          <a:noFill/>
+        </p:spPr>
+        <p:txBody>
+          <a:bodyPr wrap="square" rtlCol="0">
+            <a:spAutoFit/>
+          </a:bodyPr>
+          <a:lstStyle/>
+          <a:p>
+            <a:r>
+              <a:rPr lang="en-US" altLang="ko-KR" sz="2400" dirty="0"/>
+              <a:t>The footer contains the navigation bar. Each options take a user to dedicated section of the page.</a:t>
+            </a:r>
+            <a:endParaRPr lang="ko-KR" altLang="en-US" sz="2400" dirty="0"/>
+          </a:p>
+        </p:txBody>
+      </p:sp>
+      <p:sp>
+        <p:nvSpPr>
+          <p:cNvPr id="12" name="TextBox 11">
+            <a:extLst>
+              <a:ext uri="{FF2B5EF4-FFF2-40B4-BE49-F238E27FC236}">
+                <a16:creationId xmlns:a16="http://schemas.microsoft.com/office/drawing/2014/main" id="{B5C5A45A-571C-EBA2-3E50-4B1369C7579E}"/>
+              </a:ext>
+            </a:extLst>
+          </p:cNvPr>
+          <p:cNvSpPr txBox="1"/>
+          <p:nvPr/>
+        </p:nvSpPr>
+        <p:spPr>
+          <a:xfrm>
+            <a:off x="6629399" y="3210636"/>
+            <a:ext cx="3097531" cy="1938992"/>
+          </a:xfrm>
+          <a:prstGeom prst="rect">
+            <a:avLst/>
+          </a:prstGeom>
+          <a:noFill/>
+        </p:spPr>
+        <p:txBody>
+          <a:bodyPr wrap="square" rtlCol="0">
+            <a:spAutoFit/>
+          </a:bodyPr>
+          <a:lstStyle/>
+          <a:p>
+            <a:r>
+              <a:rPr lang="en-US" altLang="ko-KR" sz="2400" dirty="0"/>
+              <a:t>Implemented with &lt;nav&gt;</a:t>
+            </a:r>
+            <a:r>
+              <a:rPr lang="ko-KR" altLang="en-US" sz="2400" dirty="0"/>
+              <a:t> </a:t>
+            </a:r>
+            <a:r>
+              <a:rPr lang="en-US" altLang="ko-KR" sz="2400" dirty="0"/>
+              <a:t>and</a:t>
+            </a:r>
+            <a:r>
+              <a:rPr lang="ko-KR" altLang="en-US" sz="2400" dirty="0"/>
+              <a:t> </a:t>
+            </a:r>
+            <a:r>
+              <a:rPr lang="en-US" altLang="ko-KR" sz="2400" dirty="0"/>
+              <a:t>&lt;section&gt;. The scroll moves to each point by clicking the options.</a:t>
+            </a:r>
+            <a:endParaRPr lang="ko-KR" altLang="en-US" sz="2400" dirty="0"/>
+          </a:p>
+        </p:txBody>
+      </p:sp>
+      <p:pic>
+        <p:nvPicPr>
+          <p:cNvPr id="5" name="그림 4">
+            <a:extLst>
+              <a:ext uri="{FF2B5EF4-FFF2-40B4-BE49-F238E27FC236}">
+                <a16:creationId xmlns:a16="http://schemas.microsoft.com/office/drawing/2014/main" id="{4016D542-A6EC-7EE6-BBB3-B2B953C6D0CB}"/>
+              </a:ext>
+            </a:extLst>
+          </p:cNvPr>
+          <p:cNvPicPr>
+            <a:picLocks noChangeAspect="1"/>
+          </p:cNvPicPr>
+          <p:nvPr/>
+        </p:nvPicPr>
+        <p:blipFill>
+          <a:blip r:embed="rId3"/>
+          <a:srcRect l="41890" t="77845" r="39327"/>
+          <a:stretch/>
+        </p:blipFill>
+        <p:spPr>
+          <a:xfrm>
+            <a:off x="320039" y="741910"/>
+            <a:ext cx="3574893" cy="1932709"/>
+          </a:xfrm>
+          <a:prstGeom prst="rect">
+            <a:avLst/>
+          </a:prstGeom>
+        </p:spPr>
+      </p:pic>
+      <p:pic>
+        <p:nvPicPr>
+          <p:cNvPr id="8" name="그림 7">
+            <a:extLst>
+              <a:ext uri="{FF2B5EF4-FFF2-40B4-BE49-F238E27FC236}">
+                <a16:creationId xmlns:a16="http://schemas.microsoft.com/office/drawing/2014/main" id="{7D676C25-3022-F941-0044-F0D6FD57A36C}"/>
+              </a:ext>
+            </a:extLst>
+          </p:cNvPr>
+          <p:cNvPicPr>
+            <a:picLocks noChangeAspect="1"/>
+          </p:cNvPicPr>
+          <p:nvPr/>
+        </p:nvPicPr>
+        <p:blipFill>
+          <a:blip r:embed="rId4"/>
+          <a:stretch>
+            <a:fillRect/>
+          </a:stretch>
+        </p:blipFill>
+        <p:spPr>
+          <a:xfrm>
+            <a:off x="320039" y="3210636"/>
+            <a:ext cx="6173061" cy="2991267"/>
+          </a:xfrm>
+          <a:prstGeom prst="rect">
+            <a:avLst/>
+          </a:prstGeom>
+        </p:spPr>
+      </p:pic>
+    </p:spTree>
+    <p:extLst>
+      <p:ext uri="{BB962C8B-B14F-4D97-AF65-F5344CB8AC3E}">
+        <p14:creationId xmlns:p14="http://schemas.microsoft.com/office/powerpoint/2010/main" val="1190513628"/>
       </p:ext>
     </p:extLst>
   </p:cSld>

</xml_diff>